<commit_message>
Upload new team poster
</commit_message>
<xml_diff>
--- a/LG_부트캠프_10기_A반_포스터(6팀).pptx
+++ b/LG_부트캠프_10기_A반_포스터(6팀).pptx
@@ -9,17 +9,17 @@
   </p:notesMasterIdLst>
   <p:sldIdLst>
     <p:sldId id="260" r:id="rId2"/>
-    <p:sldId id="261" r:id="rId3"/>
+    <p:sldId id="263" r:id="rId3"/>
   </p:sldIdLst>
   <p:sldSz cx="6858000" cy="9906000" type="A4"/>
   <p:notesSz cx="9875838" cy="17556163"/>
   <p:embeddedFontLst>
     <p:embeddedFont>
-      <p:font typeface="LG Smart_H2.0 R" panose="020B0600000101010101" pitchFamily="50" charset="-127"/>
+      <p:font typeface="LG Smart_H2.0 R" panose="020B0604020202020204" charset="-127"/>
       <p:regular r:id="rId5"/>
     </p:embeddedFont>
     <p:embeddedFont>
-      <p:font typeface="맑은 고딕" panose="020B0503020000020004" pitchFamily="50" charset="-127"/>
+      <p:font typeface="맑은 고딕" panose="020B0503020000020004" pitchFamily="34" charset="-127"/>
       <p:regular r:id="rId6"/>
       <p:bold r:id="rId7"/>
     </p:embeddedFont>
@@ -130,15 +130,1604 @@
 <file path=ppt/revisionInfo.xml><?xml version="1.0" encoding="utf-8"?>
 <p1510:revInfo xmlns:a="http://schemas.openxmlformats.org/drawingml/2006/main" xmlns:r="http://schemas.openxmlformats.org/officeDocument/2006/relationships" xmlns:p1510="http://schemas.microsoft.com/office/powerpoint/2015/10/main">
   <p1510:revLst>
+    <p1510:client id="{035203A5-8E50-7BB7-C4EC-9E2FB25832DA}" v="2" dt="2025-07-09T16:03:28.630"/>
     <p1510:client id="{068C0D0F-062C-2C70-C144-7669E38D1DE4}" v="1068" dt="2025-07-09T08:37:43.354"/>
+    <p1510:client id="{2D9E767B-266E-FF62-DC03-2A85DC305740}" v="138" dt="2025-07-09T15:59:33.040"/>
     <p1510:client id="{5E52D203-8BCD-3FF1-06CB-98DCF02D848D}" v="432" dt="2025-07-09T08:19:51.487"/>
-    <p1510:client id="{7747A09A-DBF3-410F-B0E9-26EC7991008F}" v="1" dt="2025-07-09T08:43:02.144"/>
     <p1510:client id="{88445633-C835-1670-4675-BE561F5021A9}" v="558" dt="2025-07-09T08:42:37.675"/>
     <p1510:client id="{8FF3D557-A3D5-B4DF-7CEF-DB3020CE293F}" v="17" dt="2025-07-09T08:20:41.131"/>
     <p1510:client id="{E98EBA03-2044-EF7F-8002-85F4B932A0DB}" v="4" dt="2025-07-09T07:19:57.272"/>
     <p1510:client id="{EB63EF9C-15B9-9A72-AB5A-A33A61B7A418}" v="654" dt="2025-07-09T08:34:51.002"/>
   </p1510:revLst>
 </p1510:revInfo>
+</file>
+
+<file path=ppt/changesInfos/changesInfo1.xml><?xml version="1.0" encoding="utf-8"?>
+<pc:chgInfo xmlns:a="http://schemas.openxmlformats.org/drawingml/2006/main" xmlns:r="http://schemas.openxmlformats.org/officeDocument/2006/relationships" xmlns:ac="http://schemas.microsoft.com/office/drawing/2013/main/command" xmlns:pc="http://schemas.microsoft.com/office/powerpoint/2013/main/command">
+  <pc:docChgLst>
+    <pc:chgData name="안설령/연구원/Performance&amp;Stability Unit" userId="S::seolryeong.an@lge.com::26601665-48ad-49f3-832f-aea70d1d04d5" providerId="AD" clId="Web-{5E52D203-8BCD-3FF1-06CB-98DCF02D848D}"/>
+    <pc:docChg chg="modSld">
+      <pc:chgData name="안설령/연구원/Performance&amp;Stability Unit" userId="S::seolryeong.an@lge.com::26601665-48ad-49f3-832f-aea70d1d04d5" providerId="AD" clId="Web-{5E52D203-8BCD-3FF1-06CB-98DCF02D848D}" dt="2025-07-09T08:19:51.471" v="274" actId="1076"/>
+      <pc:docMkLst>
+        <pc:docMk/>
+      </pc:docMkLst>
+      <pc:sldChg chg="addSp delSp modSp">
+        <pc:chgData name="안설령/연구원/Performance&amp;Stability Unit" userId="S::seolryeong.an@lge.com::26601665-48ad-49f3-832f-aea70d1d04d5" providerId="AD" clId="Web-{5E52D203-8BCD-3FF1-06CB-98DCF02D848D}" dt="2025-07-09T08:19:51.471" v="274" actId="1076"/>
+        <pc:sldMkLst>
+          <pc:docMk/>
+          <pc:sldMk cId="3944304009" sldId="260"/>
+        </pc:sldMkLst>
+        <pc:spChg chg="add mod">
+          <ac:chgData name="안설령/연구원/Performance&amp;Stability Unit" userId="S::seolryeong.an@lge.com::26601665-48ad-49f3-832f-aea70d1d04d5" providerId="AD" clId="Web-{5E52D203-8BCD-3FF1-06CB-98DCF02D848D}" dt="2025-07-09T08:07:13.721" v="26" actId="14100"/>
+          <ac:spMkLst>
+            <pc:docMk/>
+            <pc:sldMk cId="3944304009" sldId="260"/>
+            <ac:spMk id="3" creationId="{51530E27-3660-588B-A265-EBE8003417EB}"/>
+          </ac:spMkLst>
+        </pc:spChg>
+        <pc:spChg chg="add mod">
+          <ac:chgData name="안설령/연구원/Performance&amp;Stability Unit" userId="S::seolryeong.an@lge.com::26601665-48ad-49f3-832f-aea70d1d04d5" providerId="AD" clId="Web-{5E52D203-8BCD-3FF1-06CB-98DCF02D848D}" dt="2025-07-09T08:08:50.772" v="61"/>
+          <ac:spMkLst>
+            <pc:docMk/>
+            <pc:sldMk cId="3944304009" sldId="260"/>
+            <ac:spMk id="6" creationId="{AF0EBF06-16E1-9B36-002C-636084BA0806}"/>
+          </ac:spMkLst>
+        </pc:spChg>
+        <pc:spChg chg="add mod">
+          <ac:chgData name="안설령/연구원/Performance&amp;Stability Unit" userId="S::seolryeong.an@lge.com::26601665-48ad-49f3-832f-aea70d1d04d5" providerId="AD" clId="Web-{5E52D203-8BCD-3FF1-06CB-98DCF02D848D}" dt="2025-07-09T08:08:50.772" v="62"/>
+          <ac:spMkLst>
+            <pc:docMk/>
+            <pc:sldMk cId="3944304009" sldId="260"/>
+            <ac:spMk id="7" creationId="{1AC7EC80-D6A7-9CAA-9EA3-1D180E01856C}"/>
+          </ac:spMkLst>
+        </pc:spChg>
+        <pc:spChg chg="add mod">
+          <ac:chgData name="안설령/연구원/Performance&amp;Stability Unit" userId="S::seolryeong.an@lge.com::26601665-48ad-49f3-832f-aea70d1d04d5" providerId="AD" clId="Web-{5E52D203-8BCD-3FF1-06CB-98DCF02D848D}" dt="2025-07-09T08:08:50.882" v="68"/>
+          <ac:spMkLst>
+            <pc:docMk/>
+            <pc:sldMk cId="3944304009" sldId="260"/>
+            <ac:spMk id="16" creationId="{87EC9838-2005-2CF4-B05D-C2E4DAC801AF}"/>
+          </ac:spMkLst>
+        </pc:spChg>
+        <pc:spChg chg="add mod">
+          <ac:chgData name="안설령/연구원/Performance&amp;Stability Unit" userId="S::seolryeong.an@lge.com::26601665-48ad-49f3-832f-aea70d1d04d5" providerId="AD" clId="Web-{5E52D203-8BCD-3FF1-06CB-98DCF02D848D}" dt="2025-07-09T08:08:50.772" v="67"/>
+          <ac:spMkLst>
+            <pc:docMk/>
+            <pc:sldMk cId="3944304009" sldId="260"/>
+            <ac:spMk id="17" creationId="{246DBE88-7CB8-ACEE-472A-A3E21675C7D6}"/>
+          </ac:spMkLst>
+        </pc:spChg>
+        <pc:spChg chg="add mod">
+          <ac:chgData name="안설령/연구원/Performance&amp;Stability Unit" userId="S::seolryeong.an@lge.com::26601665-48ad-49f3-832f-aea70d1d04d5" providerId="AD" clId="Web-{5E52D203-8BCD-3FF1-06CB-98DCF02D848D}" dt="2025-07-09T08:08:50.772" v="66"/>
+          <ac:spMkLst>
+            <pc:docMk/>
+            <pc:sldMk cId="3944304009" sldId="260"/>
+            <ac:spMk id="19" creationId="{80D3D837-B9D7-A067-706D-CFAA60E64F81}"/>
+          </ac:spMkLst>
+        </pc:spChg>
+        <pc:spChg chg="add mod">
+          <ac:chgData name="안설령/연구원/Performance&amp;Stability Unit" userId="S::seolryeong.an@lge.com::26601665-48ad-49f3-832f-aea70d1d04d5" providerId="AD" clId="Web-{5E52D203-8BCD-3FF1-06CB-98DCF02D848D}" dt="2025-07-09T08:08:50.772" v="65"/>
+          <ac:spMkLst>
+            <pc:docMk/>
+            <pc:sldMk cId="3944304009" sldId="260"/>
+            <ac:spMk id="21" creationId="{77B09E22-3F8D-FFCF-1E40-EAFEFE7B0D84}"/>
+          </ac:spMkLst>
+        </pc:spChg>
+        <pc:spChg chg="add mod">
+          <ac:chgData name="안설령/연구원/Performance&amp;Stability Unit" userId="S::seolryeong.an@lge.com::26601665-48ad-49f3-832f-aea70d1d04d5" providerId="AD" clId="Web-{5E52D203-8BCD-3FF1-06CB-98DCF02D848D}" dt="2025-07-09T08:08:50.772" v="63"/>
+          <ac:spMkLst>
+            <pc:docMk/>
+            <pc:sldMk cId="3944304009" sldId="260"/>
+            <ac:spMk id="23" creationId="{526B6B49-DC81-AE83-6C11-E7FBB05D8122}"/>
+          </ac:spMkLst>
+        </pc:spChg>
+        <pc:spChg chg="add mod">
+          <ac:chgData name="안설령/연구원/Performance&amp;Stability Unit" userId="S::seolryeong.an@lge.com::26601665-48ad-49f3-832f-aea70d1d04d5" providerId="AD" clId="Web-{5E52D203-8BCD-3FF1-06CB-98DCF02D848D}" dt="2025-07-09T08:08:50.772" v="64"/>
+          <ac:spMkLst>
+            <pc:docMk/>
+            <pc:sldMk cId="3944304009" sldId="260"/>
+            <ac:spMk id="24" creationId="{85F7B331-2A74-E6B8-E625-C1970AAA698A}"/>
+          </ac:spMkLst>
+        </pc:spChg>
+        <pc:spChg chg="add del">
+          <ac:chgData name="안설령/연구원/Performance&amp;Stability Unit" userId="S::seolryeong.an@lge.com::26601665-48ad-49f3-832f-aea70d1d04d5" providerId="AD" clId="Web-{5E52D203-8BCD-3FF1-06CB-98DCF02D848D}" dt="2025-07-09T08:09:46.978" v="85"/>
+          <ac:spMkLst>
+            <pc:docMk/>
+            <pc:sldMk cId="3944304009" sldId="260"/>
+            <ac:spMk id="29" creationId="{8E120948-99F8-F8AE-7E02-D0C0ABB90DCF}"/>
+          </ac:spMkLst>
+        </pc:spChg>
+        <pc:spChg chg="add del">
+          <ac:chgData name="안설령/연구원/Performance&amp;Stability Unit" userId="S::seolryeong.an@lge.com::26601665-48ad-49f3-832f-aea70d1d04d5" providerId="AD" clId="Web-{5E52D203-8BCD-3FF1-06CB-98DCF02D848D}" dt="2025-07-09T08:09:46.978" v="84"/>
+          <ac:spMkLst>
+            <pc:docMk/>
+            <pc:sldMk cId="3944304009" sldId="260"/>
+            <ac:spMk id="30" creationId="{147B4D2B-0916-40DF-F5DB-0C9D3C505A7F}"/>
+          </ac:spMkLst>
+        </pc:spChg>
+        <pc:spChg chg="mod">
+          <ac:chgData name="안설령/연구원/Performance&amp;Stability Unit" userId="S::seolryeong.an@lge.com::26601665-48ad-49f3-832f-aea70d1d04d5" providerId="AD" clId="Web-{5E52D203-8BCD-3FF1-06CB-98DCF02D848D}" dt="2025-07-09T08:17:33.514" v="262" actId="20577"/>
+          <ac:spMkLst>
+            <pc:docMk/>
+            <pc:sldMk cId="3944304009" sldId="260"/>
+            <ac:spMk id="43" creationId="{EDC35243-D38B-A0BB-8AA8-AB5AA7702B8E}"/>
+          </ac:spMkLst>
+        </pc:spChg>
+        <pc:spChg chg="mod">
+          <ac:chgData name="안설령/연구원/Performance&amp;Stability Unit" userId="S::seolryeong.an@lge.com::26601665-48ad-49f3-832f-aea70d1d04d5" providerId="AD" clId="Web-{5E52D203-8BCD-3FF1-06CB-98DCF02D848D}" dt="2025-07-09T08:11:06.246" v="96" actId="14100"/>
+          <ac:spMkLst>
+            <pc:docMk/>
+            <pc:sldMk cId="3944304009" sldId="260"/>
+            <ac:spMk id="44" creationId="{5ED2BCE5-D497-8DFC-8E77-ADFE0F2BAEDC}"/>
+          </ac:spMkLst>
+        </pc:spChg>
+        <pc:spChg chg="del mod">
+          <ac:chgData name="안설령/연구원/Performance&amp;Stability Unit" userId="S::seolryeong.an@lge.com::26601665-48ad-49f3-832f-aea70d1d04d5" providerId="AD" clId="Web-{5E52D203-8BCD-3FF1-06CB-98DCF02D848D}" dt="2025-07-09T08:10:59.731" v="95"/>
+          <ac:spMkLst>
+            <pc:docMk/>
+            <pc:sldMk cId="3944304009" sldId="260"/>
+            <ac:spMk id="45" creationId="{A2FAF635-134B-1EA0-2516-B27CDC2DEB8F}"/>
+          </ac:spMkLst>
+        </pc:spChg>
+        <pc:spChg chg="add del">
+          <ac:chgData name="안설령/연구원/Performance&amp;Stability Unit" userId="S::seolryeong.an@lge.com::26601665-48ad-49f3-832f-aea70d1d04d5" providerId="AD" clId="Web-{5E52D203-8BCD-3FF1-06CB-98DCF02D848D}" dt="2025-07-09T08:09:46.978" v="75"/>
+          <ac:spMkLst>
+            <pc:docMk/>
+            <pc:sldMk cId="3944304009" sldId="260"/>
+            <ac:spMk id="46" creationId="{B06952D6-0995-6077-B5E6-E6412E9C9A1C}"/>
+          </ac:spMkLst>
+        </pc:spChg>
+        <pc:spChg chg="add">
+          <ac:chgData name="안설령/연구원/Performance&amp;Stability Unit" userId="S::seolryeong.an@lge.com::26601665-48ad-49f3-832f-aea70d1d04d5" providerId="AD" clId="Web-{5E52D203-8BCD-3FF1-06CB-98DCF02D848D}" dt="2025-07-09T08:09:44.681" v="74"/>
+          <ac:spMkLst>
+            <pc:docMk/>
+            <pc:sldMk cId="3944304009" sldId="260"/>
+            <ac:spMk id="47" creationId="{4D92C7F1-949D-A7F3-F958-F70EC7D85602}"/>
+          </ac:spMkLst>
+        </pc:spChg>
+        <pc:spChg chg="add">
+          <ac:chgData name="안설령/연구원/Performance&amp;Stability Unit" userId="S::seolryeong.an@lge.com::26601665-48ad-49f3-832f-aea70d1d04d5" providerId="AD" clId="Web-{5E52D203-8BCD-3FF1-06CB-98DCF02D848D}" dt="2025-07-09T08:09:44.681" v="74"/>
+          <ac:spMkLst>
+            <pc:docMk/>
+            <pc:sldMk cId="3944304009" sldId="260"/>
+            <ac:spMk id="49" creationId="{8806FEB9-0A2A-8AF4-9D7C-51A0E240D854}"/>
+          </ac:spMkLst>
+        </pc:spChg>
+        <pc:spChg chg="add">
+          <ac:chgData name="안설령/연구원/Performance&amp;Stability Unit" userId="S::seolryeong.an@lge.com::26601665-48ad-49f3-832f-aea70d1d04d5" providerId="AD" clId="Web-{5E52D203-8BCD-3FF1-06CB-98DCF02D848D}" dt="2025-07-09T08:09:44.681" v="74"/>
+          <ac:spMkLst>
+            <pc:docMk/>
+            <pc:sldMk cId="3944304009" sldId="260"/>
+            <ac:spMk id="51" creationId="{6C439A30-C151-8527-3464-D7F11D475A31}"/>
+          </ac:spMkLst>
+        </pc:spChg>
+        <pc:spChg chg="add">
+          <ac:chgData name="안설령/연구원/Performance&amp;Stability Unit" userId="S::seolryeong.an@lge.com::26601665-48ad-49f3-832f-aea70d1d04d5" providerId="AD" clId="Web-{5E52D203-8BCD-3FF1-06CB-98DCF02D848D}" dt="2025-07-09T08:09:44.681" v="74"/>
+          <ac:spMkLst>
+            <pc:docMk/>
+            <pc:sldMk cId="3944304009" sldId="260"/>
+            <ac:spMk id="53" creationId="{F28715AF-3C43-9ECF-E57F-095BEF812912}"/>
+          </ac:spMkLst>
+        </pc:spChg>
+        <pc:spChg chg="add">
+          <ac:chgData name="안설령/연구원/Performance&amp;Stability Unit" userId="S::seolryeong.an@lge.com::26601665-48ad-49f3-832f-aea70d1d04d5" providerId="AD" clId="Web-{5E52D203-8BCD-3FF1-06CB-98DCF02D848D}" dt="2025-07-09T08:09:44.681" v="74"/>
+          <ac:spMkLst>
+            <pc:docMk/>
+            <pc:sldMk cId="3944304009" sldId="260"/>
+            <ac:spMk id="54" creationId="{369A323B-768E-FBC4-BAC1-4D3AC7135145}"/>
+          </ac:spMkLst>
+        </pc:spChg>
+        <pc:spChg chg="add del mod">
+          <ac:chgData name="안설령/연구원/Performance&amp;Stability Unit" userId="S::seolryeong.an@lge.com::26601665-48ad-49f3-832f-aea70d1d04d5" providerId="AD" clId="Web-{5E52D203-8BCD-3FF1-06CB-98DCF02D848D}" dt="2025-07-09T08:13:02.798" v="148" actId="20577"/>
+          <ac:spMkLst>
+            <pc:docMk/>
+            <pc:sldMk cId="3944304009" sldId="260"/>
+            <ac:spMk id="56" creationId="{8BF72CD8-CC15-8182-4723-4E68A8189E76}"/>
+          </ac:spMkLst>
+        </pc:spChg>
+        <pc:spChg chg="add mod">
+          <ac:chgData name="안설령/연구원/Performance&amp;Stability Unit" userId="S::seolryeong.an@lge.com::26601665-48ad-49f3-832f-aea70d1d04d5" providerId="AD" clId="Web-{5E52D203-8BCD-3FF1-06CB-98DCF02D848D}" dt="2025-07-09T08:13:11.799" v="159" actId="20577"/>
+          <ac:spMkLst>
+            <pc:docMk/>
+            <pc:sldMk cId="3944304009" sldId="260"/>
+            <ac:spMk id="57" creationId="{7657BBBE-B4B1-0E41-FC87-2EB3B66E467E}"/>
+          </ac:spMkLst>
+        </pc:spChg>
+        <pc:grpChg chg="mod">
+          <ac:chgData name="안설령/연구원/Performance&amp;Stability Unit" userId="S::seolryeong.an@lge.com::26601665-48ad-49f3-832f-aea70d1d04d5" providerId="AD" clId="Web-{5E52D203-8BCD-3FF1-06CB-98DCF02D848D}" dt="2025-07-09T08:08:28.694" v="53" actId="14100"/>
+          <ac:grpSpMkLst>
+            <pc:docMk/>
+            <pc:sldMk cId="3944304009" sldId="260"/>
+            <ac:grpSpMk id="8" creationId="{B70BAF0B-EF38-63C9-725E-306AECCC740C}"/>
+          </ac:grpSpMkLst>
+        </pc:grpChg>
+        <pc:grpChg chg="mod">
+          <ac:chgData name="안설령/연구원/Performance&amp;Stability Unit" userId="S::seolryeong.an@lge.com::26601665-48ad-49f3-832f-aea70d1d04d5" providerId="AD" clId="Web-{5E52D203-8BCD-3FF1-06CB-98DCF02D848D}" dt="2025-07-09T08:08:28.694" v="49" actId="14100"/>
+          <ac:grpSpMkLst>
+            <pc:docMk/>
+            <pc:sldMk cId="3944304009" sldId="260"/>
+            <ac:grpSpMk id="12" creationId="{F1F59420-AD6D-3619-91A4-0A1253F1E36E}"/>
+          </ac:grpSpMkLst>
+        </pc:grpChg>
+        <pc:grpChg chg="mod">
+          <ac:chgData name="안설령/연구원/Performance&amp;Stability Unit" userId="S::seolryeong.an@lge.com::26601665-48ad-49f3-832f-aea70d1d04d5" providerId="AD" clId="Web-{5E52D203-8BCD-3FF1-06CB-98DCF02D848D}" dt="2025-07-09T08:08:28.694" v="48" actId="14100"/>
+          <ac:grpSpMkLst>
+            <pc:docMk/>
+            <pc:sldMk cId="3944304009" sldId="260"/>
+            <ac:grpSpMk id="13" creationId="{3E542324-5875-C5E5-7981-C9DD2ADE847C}"/>
+          </ac:grpSpMkLst>
+        </pc:grpChg>
+        <pc:grpChg chg="mod">
+          <ac:chgData name="안설령/연구원/Performance&amp;Stability Unit" userId="S::seolryeong.an@lge.com::26601665-48ad-49f3-832f-aea70d1d04d5" providerId="AD" clId="Web-{5E52D203-8BCD-3FF1-06CB-98DCF02D848D}" dt="2025-07-09T08:08:28.694" v="47" actId="14100"/>
+          <ac:grpSpMkLst>
+            <pc:docMk/>
+            <pc:sldMk cId="3944304009" sldId="260"/>
+            <ac:grpSpMk id="14" creationId="{964472DE-9A5C-92DD-5085-92889DE1A20D}"/>
+          </ac:grpSpMkLst>
+        </pc:grpChg>
+        <pc:grpChg chg="add del mod">
+          <ac:chgData name="안설령/연구원/Performance&amp;Stability Unit" userId="S::seolryeong.an@lge.com::26601665-48ad-49f3-832f-aea70d1d04d5" providerId="AD" clId="Web-{5E52D203-8BCD-3FF1-06CB-98DCF02D848D}" dt="2025-07-09T08:09:22.101" v="73"/>
+          <ac:grpSpMkLst>
+            <pc:docMk/>
+            <pc:sldMk cId="3944304009" sldId="260"/>
+            <ac:grpSpMk id="26" creationId="{90FE1A93-C5DB-15A6-0D9D-898EC6E6CCFD}"/>
+          </ac:grpSpMkLst>
+        </pc:grpChg>
+        <pc:grpChg chg="del">
+          <ac:chgData name="안설령/연구원/Performance&amp;Stability Unit" userId="S::seolryeong.an@lge.com::26601665-48ad-49f3-832f-aea70d1d04d5" providerId="AD" clId="Web-{5E52D203-8BCD-3FF1-06CB-98DCF02D848D}" dt="2025-07-09T08:09:46.978" v="83"/>
+          <ac:grpSpMkLst>
+            <pc:docMk/>
+            <pc:sldMk cId="3944304009" sldId="260"/>
+            <ac:grpSpMk id="31" creationId="{4BEAEA0E-A5BD-6215-AD7D-89CCE45F3438}"/>
+          </ac:grpSpMkLst>
+        </pc:grpChg>
+        <pc:grpChg chg="del">
+          <ac:chgData name="안설령/연구원/Performance&amp;Stability Unit" userId="S::seolryeong.an@lge.com::26601665-48ad-49f3-832f-aea70d1d04d5" providerId="AD" clId="Web-{5E52D203-8BCD-3FF1-06CB-98DCF02D848D}" dt="2025-07-09T08:09:46.978" v="79"/>
+          <ac:grpSpMkLst>
+            <pc:docMk/>
+            <pc:sldMk cId="3944304009" sldId="260"/>
+            <ac:grpSpMk id="35" creationId="{2712016E-BB4D-F87D-B540-CF3A21EB7A7D}"/>
+          </ac:grpSpMkLst>
+        </pc:grpChg>
+        <pc:grpChg chg="del">
+          <ac:chgData name="안설령/연구원/Performance&amp;Stability Unit" userId="S::seolryeong.an@lge.com::26601665-48ad-49f3-832f-aea70d1d04d5" providerId="AD" clId="Web-{5E52D203-8BCD-3FF1-06CB-98DCF02D848D}" dt="2025-07-09T08:09:46.978" v="78"/>
+          <ac:grpSpMkLst>
+            <pc:docMk/>
+            <pc:sldMk cId="3944304009" sldId="260"/>
+            <ac:grpSpMk id="36" creationId="{D0196160-45BC-8A70-26B6-D594FC9A1816}"/>
+          </ac:grpSpMkLst>
+        </pc:grpChg>
+        <pc:grpChg chg="del">
+          <ac:chgData name="안설령/연구원/Performance&amp;Stability Unit" userId="S::seolryeong.an@lge.com::26601665-48ad-49f3-832f-aea70d1d04d5" providerId="AD" clId="Web-{5E52D203-8BCD-3FF1-06CB-98DCF02D848D}" dt="2025-07-09T08:09:46.978" v="77"/>
+          <ac:grpSpMkLst>
+            <pc:docMk/>
+            <pc:sldMk cId="3944304009" sldId="260"/>
+            <ac:grpSpMk id="39" creationId="{2E7156FB-2496-3FAB-BE8C-AF134028025C}"/>
+          </ac:grpSpMkLst>
+        </pc:grpChg>
+        <pc:picChg chg="mod modCrop">
+          <ac:chgData name="안설령/연구원/Performance&amp;Stability Unit" userId="S::seolryeong.an@lge.com::26601665-48ad-49f3-832f-aea70d1d04d5" providerId="AD" clId="Web-{5E52D203-8BCD-3FF1-06CB-98DCF02D848D}" dt="2025-07-09T08:19:50.315" v="273"/>
+          <ac:picMkLst>
+            <pc:docMk/>
+            <pc:sldMk cId="3944304009" sldId="260"/>
+            <ac:picMk id="4" creationId="{3C18219B-6F60-6F61-0DF2-F2BF224DE84E}"/>
+          </ac:picMkLst>
+        </pc:picChg>
+        <pc:picChg chg="mod">
+          <ac:chgData name="안설령/연구원/Performance&amp;Stability Unit" userId="S::seolryeong.an@lge.com::26601665-48ad-49f3-832f-aea70d1d04d5" providerId="AD" clId="Web-{5E52D203-8BCD-3FF1-06CB-98DCF02D848D}" dt="2025-07-09T08:19:51.471" v="274" actId="1076"/>
+          <ac:picMkLst>
+            <pc:docMk/>
+            <pc:sldMk cId="3944304009" sldId="260"/>
+            <ac:picMk id="5" creationId="{BDB5A6F7-679E-D9CA-C87A-F546EF257FA6}"/>
+          </ac:picMkLst>
+        </pc:picChg>
+        <pc:picChg chg="add">
+          <ac:chgData name="안설령/연구원/Performance&amp;Stability Unit" userId="S::seolryeong.an@lge.com::26601665-48ad-49f3-832f-aea70d1d04d5" providerId="AD" clId="Web-{5E52D203-8BCD-3FF1-06CB-98DCF02D848D}" dt="2025-07-09T08:08:24.583" v="31"/>
+          <ac:picMkLst>
+            <pc:docMk/>
+            <pc:sldMk cId="3944304009" sldId="260"/>
+            <ac:picMk id="20" creationId="{678D0566-7DD7-299A-4BEB-62C4A7F54990}"/>
+          </ac:picMkLst>
+        </pc:picChg>
+        <pc:picChg chg="add">
+          <ac:chgData name="안설령/연구원/Performance&amp;Stability Unit" userId="S::seolryeong.an@lge.com::26601665-48ad-49f3-832f-aea70d1d04d5" providerId="AD" clId="Web-{5E52D203-8BCD-3FF1-06CB-98DCF02D848D}" dt="2025-07-09T08:08:24.583" v="31"/>
+          <ac:picMkLst>
+            <pc:docMk/>
+            <pc:sldMk cId="3944304009" sldId="260"/>
+            <ac:picMk id="25" creationId="{9773E057-CF92-9EE7-D353-EAC4425C782E}"/>
+          </ac:picMkLst>
+        </pc:picChg>
+        <pc:picChg chg="mod">
+          <ac:chgData name="안설령/연구원/Performance&amp;Stability Unit" userId="S::seolryeong.an@lge.com::26601665-48ad-49f3-832f-aea70d1d04d5" providerId="AD" clId="Web-{5E52D203-8BCD-3FF1-06CB-98DCF02D848D}" dt="2025-07-09T08:18:44.015" v="265" actId="1076"/>
+          <ac:picMkLst>
+            <pc:docMk/>
+            <pc:sldMk cId="3944304009" sldId="260"/>
+            <ac:picMk id="38" creationId="{B3BF3DE6-5942-3393-2A3A-8C66D736F41D}"/>
+          </ac:picMkLst>
+        </pc:picChg>
+        <pc:picChg chg="add">
+          <ac:chgData name="안설령/연구원/Performance&amp;Stability Unit" userId="S::seolryeong.an@lge.com::26601665-48ad-49f3-832f-aea70d1d04d5" providerId="AD" clId="Web-{5E52D203-8BCD-3FF1-06CB-98DCF02D848D}" dt="2025-07-09T08:09:44.681" v="74"/>
+          <ac:picMkLst>
+            <pc:docMk/>
+            <pc:sldMk cId="3944304009" sldId="260"/>
+            <ac:picMk id="50" creationId="{CB87139A-C1B2-1C5F-9545-C1F963A19054}"/>
+          </ac:picMkLst>
+        </pc:picChg>
+        <pc:picChg chg="add">
+          <ac:chgData name="안설령/연구원/Performance&amp;Stability Unit" userId="S::seolryeong.an@lge.com::26601665-48ad-49f3-832f-aea70d1d04d5" providerId="AD" clId="Web-{5E52D203-8BCD-3FF1-06CB-98DCF02D848D}" dt="2025-07-09T08:09:44.681" v="74"/>
+          <ac:picMkLst>
+            <pc:docMk/>
+            <pc:sldMk cId="3944304009" sldId="260"/>
+            <ac:picMk id="52" creationId="{5E7CBFAA-F86B-6427-D3CA-A2C525A28F43}"/>
+          </ac:picMkLst>
+        </pc:picChg>
+        <pc:cxnChg chg="mod">
+          <ac:chgData name="안설령/연구원/Performance&amp;Stability Unit" userId="S::seolryeong.an@lge.com::26601665-48ad-49f3-832f-aea70d1d04d5" providerId="AD" clId="Web-{5E52D203-8BCD-3FF1-06CB-98DCF02D848D}" dt="2025-07-09T08:08:28.694" v="57" actId="14100"/>
+          <ac:cxnSpMkLst>
+            <pc:docMk/>
+            <pc:sldMk cId="3944304009" sldId="260"/>
+            <ac:cxnSpMk id="4" creationId="{E99380A1-AA48-A6EC-F8B5-C2348CC5865E}"/>
+          </ac:cxnSpMkLst>
+        </pc:cxnChg>
+        <pc:cxnChg chg="mod">
+          <ac:chgData name="안설령/연구원/Performance&amp;Stability Unit" userId="S::seolryeong.an@lge.com::26601665-48ad-49f3-832f-aea70d1d04d5" providerId="AD" clId="Web-{5E52D203-8BCD-3FF1-06CB-98DCF02D848D}" dt="2025-07-09T08:08:28.694" v="56" actId="14100"/>
+          <ac:cxnSpMkLst>
+            <pc:docMk/>
+            <pc:sldMk cId="3944304009" sldId="260"/>
+            <ac:cxnSpMk id="5" creationId="{5A276734-8AFA-62E6-39E1-DA988CD458B6}"/>
+          </ac:cxnSpMkLst>
+        </pc:cxnChg>
+        <pc:cxnChg chg="mod">
+          <ac:chgData name="안설령/연구원/Performance&amp;Stability Unit" userId="S::seolryeong.an@lge.com::26601665-48ad-49f3-832f-aea70d1d04d5" providerId="AD" clId="Web-{5E52D203-8BCD-3FF1-06CB-98DCF02D848D}" dt="2025-07-09T08:08:28.694" v="52" actId="14100"/>
+          <ac:cxnSpMkLst>
+            <pc:docMk/>
+            <pc:sldMk cId="3944304009" sldId="260"/>
+            <ac:cxnSpMk id="9" creationId="{B468E404-EDB7-224C-321E-0FDB089BF3E3}"/>
+          </ac:cxnSpMkLst>
+        </pc:cxnChg>
+        <pc:cxnChg chg="mod">
+          <ac:chgData name="안설령/연구원/Performance&amp;Stability Unit" userId="S::seolryeong.an@lge.com::26601665-48ad-49f3-832f-aea70d1d04d5" providerId="AD" clId="Web-{5E52D203-8BCD-3FF1-06CB-98DCF02D848D}" dt="2025-07-09T08:08:28.694" v="51" actId="14100"/>
+          <ac:cxnSpMkLst>
+            <pc:docMk/>
+            <pc:sldMk cId="3944304009" sldId="260"/>
+            <ac:cxnSpMk id="10" creationId="{0CE2079D-309A-0F2F-12C6-475269450C83}"/>
+          </ac:cxnSpMkLst>
+        </pc:cxnChg>
+        <pc:cxnChg chg="mod">
+          <ac:chgData name="안설령/연구원/Performance&amp;Stability Unit" userId="S::seolryeong.an@lge.com::26601665-48ad-49f3-832f-aea70d1d04d5" providerId="AD" clId="Web-{5E52D203-8BCD-3FF1-06CB-98DCF02D848D}" dt="2025-07-09T08:08:28.694" v="50" actId="14100"/>
+          <ac:cxnSpMkLst>
+            <pc:docMk/>
+            <pc:sldMk cId="3944304009" sldId="260"/>
+            <ac:cxnSpMk id="11" creationId="{861C5A16-0709-8B30-578E-12ECF83CBF07}"/>
+          </ac:cxnSpMkLst>
+        </pc:cxnChg>
+        <pc:cxnChg chg="mod">
+          <ac:chgData name="안설령/연구원/Performance&amp;Stability Unit" userId="S::seolryeong.an@lge.com::26601665-48ad-49f3-832f-aea70d1d04d5" providerId="AD" clId="Web-{5E52D203-8BCD-3FF1-06CB-98DCF02D848D}" dt="2025-07-09T08:08:28.694" v="46" actId="14100"/>
+          <ac:cxnSpMkLst>
+            <pc:docMk/>
+            <pc:sldMk cId="3944304009" sldId="260"/>
+            <ac:cxnSpMk id="15" creationId="{4284F113-2098-7E7A-D158-A491A9FCDDCB}"/>
+          </ac:cxnSpMkLst>
+        </pc:cxnChg>
+        <pc:cxnChg chg="del">
+          <ac:chgData name="안설령/연구원/Performance&amp;Stability Unit" userId="S::seolryeong.an@lge.com::26601665-48ad-49f3-832f-aea70d1d04d5" providerId="AD" clId="Web-{5E52D203-8BCD-3FF1-06CB-98DCF02D848D}" dt="2025-07-09T08:09:46.978" v="87"/>
+          <ac:cxnSpMkLst>
+            <pc:docMk/>
+            <pc:sldMk cId="3944304009" sldId="260"/>
+            <ac:cxnSpMk id="27" creationId="{EB85BCD0-C6C2-6037-25E3-C86C8BDF7845}"/>
+          </ac:cxnSpMkLst>
+        </pc:cxnChg>
+        <pc:cxnChg chg="del">
+          <ac:chgData name="안설령/연구원/Performance&amp;Stability Unit" userId="S::seolryeong.an@lge.com::26601665-48ad-49f3-832f-aea70d1d04d5" providerId="AD" clId="Web-{5E52D203-8BCD-3FF1-06CB-98DCF02D848D}" dt="2025-07-09T08:09:46.978" v="86"/>
+          <ac:cxnSpMkLst>
+            <pc:docMk/>
+            <pc:sldMk cId="3944304009" sldId="260"/>
+            <ac:cxnSpMk id="28" creationId="{F0C65B2A-7908-F973-D457-6BFF9A446E4A}"/>
+          </ac:cxnSpMkLst>
+        </pc:cxnChg>
+        <pc:cxnChg chg="del">
+          <ac:chgData name="안설령/연구원/Performance&amp;Stability Unit" userId="S::seolryeong.an@lge.com::26601665-48ad-49f3-832f-aea70d1d04d5" providerId="AD" clId="Web-{5E52D203-8BCD-3FF1-06CB-98DCF02D848D}" dt="2025-07-09T08:09:46.978" v="82"/>
+          <ac:cxnSpMkLst>
+            <pc:docMk/>
+            <pc:sldMk cId="3944304009" sldId="260"/>
+            <ac:cxnSpMk id="32" creationId="{72E01851-01D2-A7D4-BB0F-DFC0C97D409A}"/>
+          </ac:cxnSpMkLst>
+        </pc:cxnChg>
+        <pc:cxnChg chg="del">
+          <ac:chgData name="안설령/연구원/Performance&amp;Stability Unit" userId="S::seolryeong.an@lge.com::26601665-48ad-49f3-832f-aea70d1d04d5" providerId="AD" clId="Web-{5E52D203-8BCD-3FF1-06CB-98DCF02D848D}" dt="2025-07-09T08:09:46.978" v="81"/>
+          <ac:cxnSpMkLst>
+            <pc:docMk/>
+            <pc:sldMk cId="3944304009" sldId="260"/>
+            <ac:cxnSpMk id="33" creationId="{8DD6949F-84F8-CD97-8BB7-B18910CD13FE}"/>
+          </ac:cxnSpMkLst>
+        </pc:cxnChg>
+        <pc:cxnChg chg="del">
+          <ac:chgData name="안설령/연구원/Performance&amp;Stability Unit" userId="S::seolryeong.an@lge.com::26601665-48ad-49f3-832f-aea70d1d04d5" providerId="AD" clId="Web-{5E52D203-8BCD-3FF1-06CB-98DCF02D848D}" dt="2025-07-09T08:09:46.978" v="80"/>
+          <ac:cxnSpMkLst>
+            <pc:docMk/>
+            <pc:sldMk cId="3944304009" sldId="260"/>
+            <ac:cxnSpMk id="34" creationId="{5C2AACFA-5189-3387-9765-DE9F04B92A7F}"/>
+          </ac:cxnSpMkLst>
+        </pc:cxnChg>
+        <pc:cxnChg chg="del">
+          <ac:chgData name="안설령/연구원/Performance&amp;Stability Unit" userId="S::seolryeong.an@lge.com::26601665-48ad-49f3-832f-aea70d1d04d5" providerId="AD" clId="Web-{5E52D203-8BCD-3FF1-06CB-98DCF02D848D}" dt="2025-07-09T08:09:46.978" v="76"/>
+          <ac:cxnSpMkLst>
+            <pc:docMk/>
+            <pc:sldMk cId="3944304009" sldId="260"/>
+            <ac:cxnSpMk id="41" creationId="{B98F8E7C-EB4D-02C0-077C-8C3240DBB48B}"/>
+          </ac:cxnSpMkLst>
+        </pc:cxnChg>
+        <pc:cxnChg chg="add mod">
+          <ac:chgData name="안설령/연구원/Performance&amp;Stability Unit" userId="S::seolryeong.an@lge.com::26601665-48ad-49f3-832f-aea70d1d04d5" providerId="AD" clId="Web-{5E52D203-8BCD-3FF1-06CB-98DCF02D848D}" dt="2025-07-09T08:12:23.391" v="108"/>
+          <ac:cxnSpMkLst>
+            <pc:docMk/>
+            <pc:sldMk cId="3944304009" sldId="260"/>
+            <ac:cxnSpMk id="58" creationId="{44B53FC7-2DA1-B94D-D831-54D1D0D9679B}"/>
+          </ac:cxnSpMkLst>
+        </pc:cxnChg>
+      </pc:sldChg>
+    </pc:docChg>
+  </pc:docChgLst>
+  <pc:docChgLst>
+    <pc:chgData name="문명석/연구원/Cyber Security Engineering Unit" userId="S::myungsuk.moon@lge.com::fca14cfd-2a2a-44ce-bee2-3070c7406398" providerId="AD" clId="Web-{2D9E767B-266E-FF62-DC03-2A85DC305740}"/>
+    <pc:docChg chg="addSld delSld modSld modMainMaster">
+      <pc:chgData name="문명석/연구원/Cyber Security Engineering Unit" userId="S::myungsuk.moon@lge.com::fca14cfd-2a2a-44ce-bee2-3070c7406398" providerId="AD" clId="Web-{2D9E767B-266E-FF62-DC03-2A85DC305740}" dt="2025-07-09T15:59:31.665" v="108" actId="20577"/>
+      <pc:docMkLst>
+        <pc:docMk/>
+      </pc:docMkLst>
+      <pc:sldChg chg="addSp delSp modSp">
+        <pc:chgData name="문명석/연구원/Cyber Security Engineering Unit" userId="S::myungsuk.moon@lge.com::fca14cfd-2a2a-44ce-bee2-3070c7406398" providerId="AD" clId="Web-{2D9E767B-266E-FF62-DC03-2A85DC305740}" dt="2025-07-09T15:59:25.509" v="106" actId="20577"/>
+        <pc:sldMkLst>
+          <pc:docMk/>
+          <pc:sldMk cId="3944304009" sldId="260"/>
+        </pc:sldMkLst>
+        <pc:spChg chg="mod">
+          <ac:chgData name="문명석/연구원/Cyber Security Engineering Unit" userId="S::myungsuk.moon@lge.com::fca14cfd-2a2a-44ce-bee2-3070c7406398" providerId="AD" clId="Web-{2D9E767B-266E-FF62-DC03-2A85DC305740}" dt="2025-07-09T15:58:31.224" v="89" actId="20577"/>
+          <ac:spMkLst>
+            <pc:docMk/>
+            <pc:sldMk cId="3944304009" sldId="260"/>
+            <ac:spMk id="2" creationId="{00000000-0000-0000-0000-000000000000}"/>
+          </ac:spMkLst>
+        </pc:spChg>
+        <pc:spChg chg="add mod">
+          <ac:chgData name="문명석/연구원/Cyber Security Engineering Unit" userId="S::myungsuk.moon@lge.com::fca14cfd-2a2a-44ce-bee2-3070c7406398" providerId="AD" clId="Web-{2D9E767B-266E-FF62-DC03-2A85DC305740}" dt="2025-07-09T15:59:25.509" v="106" actId="20577"/>
+          <ac:spMkLst>
+            <pc:docMk/>
+            <pc:sldMk cId="3944304009" sldId="260"/>
+            <ac:spMk id="7" creationId="{95184400-A0E2-BDC9-3FCC-4D7002C53F35}"/>
+          </ac:spMkLst>
+        </pc:spChg>
+        <pc:picChg chg="del">
+          <ac:chgData name="문명석/연구원/Cyber Security Engineering Unit" userId="S::myungsuk.moon@lge.com::fca14cfd-2a2a-44ce-bee2-3070c7406398" providerId="AD" clId="Web-{2D9E767B-266E-FF62-DC03-2A85DC305740}" dt="2025-07-09T15:53:27.919" v="2"/>
+          <ac:picMkLst>
+            <pc:docMk/>
+            <pc:sldMk cId="3944304009" sldId="260"/>
+            <ac:picMk id="5" creationId="{BDB5A6F7-679E-D9CA-C87A-F546EF257FA6}"/>
+          </ac:picMkLst>
+        </pc:picChg>
+        <pc:picChg chg="add mod">
+          <ac:chgData name="문명석/연구원/Cyber Security Engineering Unit" userId="S::myungsuk.moon@lge.com::fca14cfd-2a2a-44ce-bee2-3070c7406398" providerId="AD" clId="Web-{2D9E767B-266E-FF62-DC03-2A85DC305740}" dt="2025-07-09T15:54:06.906" v="12" actId="1076"/>
+          <ac:picMkLst>
+            <pc:docMk/>
+            <pc:sldMk cId="3944304009" sldId="260"/>
+            <ac:picMk id="6" creationId="{7835AA02-9641-4B9B-85F1-6657E59F606D}"/>
+          </ac:picMkLst>
+        </pc:picChg>
+      </pc:sldChg>
+      <pc:sldChg chg="del">
+        <pc:chgData name="문명석/연구원/Cyber Security Engineering Unit" userId="S::myungsuk.moon@lge.com::fca14cfd-2a2a-44ce-bee2-3070c7406398" providerId="AD" clId="Web-{2D9E767B-266E-FF62-DC03-2A85DC305740}" dt="2025-07-09T15:57:55.347" v="84"/>
+        <pc:sldMkLst>
+          <pc:docMk/>
+          <pc:sldMk cId="3287572541" sldId="261"/>
+        </pc:sldMkLst>
+      </pc:sldChg>
+      <pc:sldChg chg="add del replId">
+        <pc:chgData name="문명석/연구원/Cyber Security Engineering Unit" userId="S::myungsuk.moon@lge.com::fca14cfd-2a2a-44ce-bee2-3070c7406398" providerId="AD" clId="Web-{2D9E767B-266E-FF62-DC03-2A85DC305740}" dt="2025-07-09T15:57:55.347" v="85"/>
+        <pc:sldMkLst>
+          <pc:docMk/>
+          <pc:sldMk cId="2433083482" sldId="262"/>
+        </pc:sldMkLst>
+      </pc:sldChg>
+      <pc:sldChg chg="addSp delSp modSp add replId">
+        <pc:chgData name="문명석/연구원/Cyber Security Engineering Unit" userId="S::myungsuk.moon@lge.com::fca14cfd-2a2a-44ce-bee2-3070c7406398" providerId="AD" clId="Web-{2D9E767B-266E-FF62-DC03-2A85DC305740}" dt="2025-07-09T15:59:31.665" v="108" actId="20577"/>
+        <pc:sldMkLst>
+          <pc:docMk/>
+          <pc:sldMk cId="1680971983" sldId="263"/>
+        </pc:sldMkLst>
+        <pc:spChg chg="mod">
+          <ac:chgData name="문명석/연구원/Cyber Security Engineering Unit" userId="S::myungsuk.moon@lge.com::fca14cfd-2a2a-44ce-bee2-3070c7406398" providerId="AD" clId="Web-{2D9E767B-266E-FF62-DC03-2A85DC305740}" dt="2025-07-09T15:56:52.526" v="68" actId="14100"/>
+          <ac:spMkLst>
+            <pc:docMk/>
+            <pc:sldMk cId="1680971983" sldId="263"/>
+            <ac:spMk id="3" creationId="{412C0A92-7F20-2B99-DCE8-A2C06D8C396A}"/>
+          </ac:spMkLst>
+        </pc:spChg>
+        <pc:spChg chg="mod">
+          <ac:chgData name="문명석/연구원/Cyber Security Engineering Unit" userId="S::myungsuk.moon@lge.com::fca14cfd-2a2a-44ce-bee2-3070c7406398" providerId="AD" clId="Web-{2D9E767B-266E-FF62-DC03-2A85DC305740}" dt="2025-07-09T15:56:58.828" v="70" actId="14100"/>
+          <ac:spMkLst>
+            <pc:docMk/>
+            <pc:sldMk cId="1680971983" sldId="263"/>
+            <ac:spMk id="5" creationId="{05632D81-B1C7-BF08-10EA-FBB409B995BE}"/>
+          </ac:spMkLst>
+        </pc:spChg>
+        <pc:spChg chg="add mod">
+          <ac:chgData name="문명석/연구원/Cyber Security Engineering Unit" userId="S::myungsuk.moon@lge.com::fca14cfd-2a2a-44ce-bee2-3070c7406398" providerId="AD" clId="Web-{2D9E767B-266E-FF62-DC03-2A85DC305740}" dt="2025-07-09T15:59:31.665" v="108" actId="20577"/>
+          <ac:spMkLst>
+            <pc:docMk/>
+            <pc:sldMk cId="1680971983" sldId="263"/>
+            <ac:spMk id="9" creationId="{1999D780-52C8-A3D6-1523-67909F7B7224}"/>
+          </ac:spMkLst>
+        </pc:spChg>
+        <pc:spChg chg="ord">
+          <ac:chgData name="문명석/연구원/Cyber Security Engineering Unit" userId="S::myungsuk.moon@lge.com::fca14cfd-2a2a-44ce-bee2-3070c7406398" providerId="AD" clId="Web-{2D9E767B-266E-FF62-DC03-2A85DC305740}" dt="2025-07-09T15:57:50.409" v="83"/>
+          <ac:spMkLst>
+            <pc:docMk/>
+            <pc:sldMk cId="1680971983" sldId="263"/>
+            <ac:spMk id="69" creationId="{98BBB3CB-E2C0-5AAD-DB71-B5307906A006}"/>
+          </ac:spMkLst>
+        </pc:spChg>
+        <pc:spChg chg="mod">
+          <ac:chgData name="문명석/연구원/Cyber Security Engineering Unit" userId="S::myungsuk.moon@lge.com::fca14cfd-2a2a-44ce-bee2-3070c7406398" providerId="AD" clId="Web-{2D9E767B-266E-FF62-DC03-2A85DC305740}" dt="2025-07-09T15:57:39.752" v="82" actId="20577"/>
+          <ac:spMkLst>
+            <pc:docMk/>
+            <pc:sldMk cId="1680971983" sldId="263"/>
+            <ac:spMk id="74" creationId="{6761F9B3-9F31-7A64-224B-5CCC7A928F98}"/>
+          </ac:spMkLst>
+        </pc:spChg>
+        <pc:spChg chg="ord">
+          <ac:chgData name="문명석/연구원/Cyber Security Engineering Unit" userId="S::myungsuk.moon@lge.com::fca14cfd-2a2a-44ce-bee2-3070c7406398" providerId="AD" clId="Web-{2D9E767B-266E-FF62-DC03-2A85DC305740}" dt="2025-07-09T15:54:31.157" v="18"/>
+          <ac:spMkLst>
+            <pc:docMk/>
+            <pc:sldMk cId="1680971983" sldId="263"/>
+            <ac:spMk id="75" creationId="{F87147C3-831E-6FB9-C906-EB18993597C8}"/>
+          </ac:spMkLst>
+        </pc:spChg>
+        <pc:spChg chg="mod">
+          <ac:chgData name="문명석/연구원/Cyber Security Engineering Unit" userId="S::myungsuk.moon@lge.com::fca14cfd-2a2a-44ce-bee2-3070c7406398" providerId="AD" clId="Web-{2D9E767B-266E-FF62-DC03-2A85DC305740}" dt="2025-07-09T15:56:51.338" v="67" actId="1076"/>
+          <ac:spMkLst>
+            <pc:docMk/>
+            <pc:sldMk cId="1680971983" sldId="263"/>
+            <ac:spMk id="76" creationId="{2890174C-EAF9-5E5F-6416-27F800EA6396}"/>
+          </ac:spMkLst>
+        </pc:spChg>
+        <pc:picChg chg="add mod">
+          <ac:chgData name="문명석/연구원/Cyber Security Engineering Unit" userId="S::myungsuk.moon@lge.com::fca14cfd-2a2a-44ce-bee2-3070c7406398" providerId="AD" clId="Web-{2D9E767B-266E-FF62-DC03-2A85DC305740}" dt="2025-07-09T15:54:54.502" v="22" actId="1076"/>
+          <ac:picMkLst>
+            <pc:docMk/>
+            <pc:sldMk cId="1680971983" sldId="263"/>
+            <ac:picMk id="4" creationId="{A92CE6D3-3599-829A-F666-FD76E95D90E5}"/>
+          </ac:picMkLst>
+        </pc:picChg>
+        <pc:picChg chg="add mod">
+          <ac:chgData name="문명석/연구원/Cyber Security Engineering Unit" userId="S::myungsuk.moon@lge.com::fca14cfd-2a2a-44ce-bee2-3070c7406398" providerId="AD" clId="Web-{2D9E767B-266E-FF62-DC03-2A85DC305740}" dt="2025-07-09T15:55:42.052" v="38" actId="1076"/>
+          <ac:picMkLst>
+            <pc:docMk/>
+            <pc:sldMk cId="1680971983" sldId="263"/>
+            <ac:picMk id="6" creationId="{AD0E5F62-FEB8-33C8-7997-E62667B7B34C}"/>
+          </ac:picMkLst>
+        </pc:picChg>
+        <pc:picChg chg="add mod">
+          <ac:chgData name="문명석/연구원/Cyber Security Engineering Unit" userId="S::myungsuk.moon@lge.com::fca14cfd-2a2a-44ce-bee2-3070c7406398" providerId="AD" clId="Web-{2D9E767B-266E-FF62-DC03-2A85DC305740}" dt="2025-07-09T15:57:19.345" v="79" actId="1076"/>
+          <ac:picMkLst>
+            <pc:docMk/>
+            <pc:sldMk cId="1680971983" sldId="263"/>
+            <ac:picMk id="7" creationId="{461CF0B9-AC27-B4D4-3E40-8D7664B62BE0}"/>
+          </ac:picMkLst>
+        </pc:picChg>
+        <pc:picChg chg="del">
+          <ac:chgData name="문명석/연구원/Cyber Security Engineering Unit" userId="S::myungsuk.moon@lge.com::fca14cfd-2a2a-44ce-bee2-3070c7406398" providerId="AD" clId="Web-{2D9E767B-266E-FF62-DC03-2A85DC305740}" dt="2025-07-09T15:54:13.203" v="13"/>
+          <ac:picMkLst>
+            <pc:docMk/>
+            <pc:sldMk cId="1680971983" sldId="263"/>
+            <ac:picMk id="67" creationId="{FB177B3A-A581-0942-8C89-79813F132D95}"/>
+          </ac:picMkLst>
+        </pc:picChg>
+        <pc:picChg chg="del">
+          <ac:chgData name="문명석/연구원/Cyber Security Engineering Unit" userId="S::myungsuk.moon@lge.com::fca14cfd-2a2a-44ce-bee2-3070c7406398" providerId="AD" clId="Web-{2D9E767B-266E-FF62-DC03-2A85DC305740}" dt="2025-07-09T15:55:54.647" v="43"/>
+          <ac:picMkLst>
+            <pc:docMk/>
+            <pc:sldMk cId="1680971983" sldId="263"/>
+            <ac:picMk id="71" creationId="{573D5229-A607-07A4-2A98-E1546EBE80BF}"/>
+          </ac:picMkLst>
+        </pc:picChg>
+        <pc:picChg chg="del">
+          <ac:chgData name="문명석/연구원/Cyber Security Engineering Unit" userId="S::myungsuk.moon@lge.com::fca14cfd-2a2a-44ce-bee2-3070c7406398" providerId="AD" clId="Web-{2D9E767B-266E-FF62-DC03-2A85DC305740}" dt="2025-07-09T15:55:01.003" v="23"/>
+          <ac:picMkLst>
+            <pc:docMk/>
+            <pc:sldMk cId="1680971983" sldId="263"/>
+            <ac:picMk id="72" creationId="{CAE73EE3-3F74-6438-D5D0-501A2BFB8028}"/>
+          </ac:picMkLst>
+        </pc:picChg>
+      </pc:sldChg>
+      <pc:sldMasterChg chg="mod modSldLayout">
+        <pc:chgData name="문명석/연구원/Cyber Security Engineering Unit" userId="S::myungsuk.moon@lge.com::fca14cfd-2a2a-44ce-bee2-3070c7406398" providerId="AD" clId="Web-{2D9E767B-266E-FF62-DC03-2A85DC305740}" dt="2025-07-09T15:58:44.741" v="90"/>
+        <pc:sldMasterMkLst>
+          <pc:docMk/>
+          <pc:sldMasterMk cId="897976641" sldId="2147483663"/>
+        </pc:sldMasterMkLst>
+        <pc:sldLayoutChg chg="mod">
+          <pc:chgData name="문명석/연구원/Cyber Security Engineering Unit" userId="S::myungsuk.moon@lge.com::fca14cfd-2a2a-44ce-bee2-3070c7406398" providerId="AD" clId="Web-{2D9E767B-266E-FF62-DC03-2A85DC305740}" dt="2025-07-09T15:58:44.741" v="90"/>
+          <pc:sldLayoutMkLst>
+            <pc:docMk/>
+            <pc:sldMasterMk cId="897976641" sldId="2147483663"/>
+            <pc:sldLayoutMk cId="2138832528" sldId="2147483675"/>
+          </pc:sldLayoutMkLst>
+        </pc:sldLayoutChg>
+      </pc:sldMasterChg>
+    </pc:docChg>
+  </pc:docChgLst>
+  <pc:docChgLst>
+    <pc:chgData name="문명석/연구원/Cyber Security Engineering Unit" userId="S::myungsuk.moon@lge.com::fca14cfd-2a2a-44ce-bee2-3070c7406398" providerId="AD" clId="Web-{035203A5-8E50-7BB7-C4EC-9E2FB25832DA}"/>
+    <pc:docChg chg="modSld">
+      <pc:chgData name="문명석/연구원/Cyber Security Engineering Unit" userId="S::myungsuk.moon@lge.com::fca14cfd-2a2a-44ce-bee2-3070c7406398" providerId="AD" clId="Web-{035203A5-8E50-7BB7-C4EC-9E2FB25832DA}" dt="2025-07-09T16:03:28.630" v="1" actId="1076"/>
+      <pc:docMkLst>
+        <pc:docMk/>
+      </pc:docMkLst>
+      <pc:sldChg chg="modSp">
+        <pc:chgData name="문명석/연구원/Cyber Security Engineering Unit" userId="S::myungsuk.moon@lge.com::fca14cfd-2a2a-44ce-bee2-3070c7406398" providerId="AD" clId="Web-{035203A5-8E50-7BB7-C4EC-9E2FB25832DA}" dt="2025-07-09T16:03:28.630" v="1" actId="1076"/>
+        <pc:sldMkLst>
+          <pc:docMk/>
+          <pc:sldMk cId="3944304009" sldId="260"/>
+        </pc:sldMkLst>
+        <pc:picChg chg="mod">
+          <ac:chgData name="문명석/연구원/Cyber Security Engineering Unit" userId="S::myungsuk.moon@lge.com::fca14cfd-2a2a-44ce-bee2-3070c7406398" providerId="AD" clId="Web-{035203A5-8E50-7BB7-C4EC-9E2FB25832DA}" dt="2025-07-09T16:03:28.630" v="1" actId="1076"/>
+          <ac:picMkLst>
+            <pc:docMk/>
+            <pc:sldMk cId="3944304009" sldId="260"/>
+            <ac:picMk id="6" creationId="{7835AA02-9641-4B9B-85F1-6657E59F606D}"/>
+          </ac:picMkLst>
+        </pc:picChg>
+      </pc:sldChg>
+    </pc:docChg>
+  </pc:docChgLst>
+  <pc:docChgLst>
+    <pc:chgData name="문명석/연구원/Cyber Security Engineering Unit" userId="S::myungsuk.moon@lge.com::fca14cfd-2a2a-44ce-bee2-3070c7406398" providerId="AD" clId="Web-{068C0D0F-062C-2C70-C144-7669E38D1DE4}"/>
+    <pc:docChg chg="mod addSld delSld modSld modMainMaster">
+      <pc:chgData name="문명석/연구원/Cyber Security Engineering Unit" userId="S::myungsuk.moon@lge.com::fca14cfd-2a2a-44ce-bee2-3070c7406398" providerId="AD" clId="Web-{068C0D0F-062C-2C70-C144-7669E38D1DE4}" dt="2025-07-09T08:37:42.635" v="671" actId="20577"/>
+      <pc:docMkLst>
+        <pc:docMk/>
+      </pc:docMkLst>
+      <pc:sldChg chg="addSp delSp modSp mod setBg">
+        <pc:chgData name="문명석/연구원/Cyber Security Engineering Unit" userId="S::myungsuk.moon@lge.com::fca14cfd-2a2a-44ce-bee2-3070c7406398" providerId="AD" clId="Web-{068C0D0F-062C-2C70-C144-7669E38D1DE4}" dt="2025-07-09T08:37:42.635" v="671" actId="20577"/>
+        <pc:sldMkLst>
+          <pc:docMk/>
+          <pc:sldMk cId="3944304009" sldId="260"/>
+        </pc:sldMkLst>
+        <pc:spChg chg="mod">
+          <ac:chgData name="문명석/연구원/Cyber Security Engineering Unit" userId="S::myungsuk.moon@lge.com::fca14cfd-2a2a-44ce-bee2-3070c7406398" providerId="AD" clId="Web-{068C0D0F-062C-2C70-C144-7669E38D1DE4}" dt="2025-07-09T06:02:42.968" v="4" actId="20577"/>
+          <ac:spMkLst>
+            <pc:docMk/>
+            <pc:sldMk cId="3944304009" sldId="260"/>
+            <ac:spMk id="2" creationId="{00000000-0000-0000-0000-000000000000}"/>
+          </ac:spMkLst>
+        </pc:spChg>
+        <pc:spChg chg="del mod">
+          <ac:chgData name="문명석/연구원/Cyber Security Engineering Unit" userId="S::myungsuk.moon@lge.com::fca14cfd-2a2a-44ce-bee2-3070c7406398" providerId="AD" clId="Web-{068C0D0F-062C-2C70-C144-7669E38D1DE4}" dt="2025-07-09T07:32:52.310" v="15"/>
+          <ac:spMkLst>
+            <pc:docMk/>
+            <pc:sldMk cId="3944304009" sldId="260"/>
+            <ac:spMk id="3" creationId="{3C39C94F-6678-3340-D2C1-6DDBC2622F92}"/>
+          </ac:spMkLst>
+        </pc:spChg>
+        <pc:spChg chg="add del mod">
+          <ac:chgData name="문명석/연구원/Cyber Security Engineering Unit" userId="S::myungsuk.moon@lge.com::fca14cfd-2a2a-44ce-bee2-3070c7406398" providerId="AD" clId="Web-{068C0D0F-062C-2C70-C144-7669E38D1DE4}" dt="2025-07-09T07:43:07.793" v="70"/>
+          <ac:spMkLst>
+            <pc:docMk/>
+            <pc:sldMk cId="3944304009" sldId="260"/>
+            <ac:spMk id="6" creationId="{F5B47A8D-60AE-523F-8C9B-60782527BB3F}"/>
+          </ac:spMkLst>
+        </pc:spChg>
+        <pc:spChg chg="add del">
+          <ac:chgData name="문명석/연구원/Cyber Security Engineering Unit" userId="S::myungsuk.moon@lge.com::fca14cfd-2a2a-44ce-bee2-3070c7406398" providerId="AD" clId="Web-{068C0D0F-062C-2C70-C144-7669E38D1DE4}" dt="2025-07-09T07:43:04.058" v="56"/>
+          <ac:spMkLst>
+            <pc:docMk/>
+            <pc:sldMk cId="3944304009" sldId="260"/>
+            <ac:spMk id="19" creationId="{445EC3E1-F866-8A6B-BC62-D68AB9F39128}"/>
+          </ac:spMkLst>
+        </pc:spChg>
+        <pc:spChg chg="add del">
+          <ac:chgData name="문명석/연구원/Cyber Security Engineering Unit" userId="S::myungsuk.moon@lge.com::fca14cfd-2a2a-44ce-bee2-3070c7406398" providerId="AD" clId="Web-{068C0D0F-062C-2C70-C144-7669E38D1DE4}" dt="2025-07-09T07:43:04.058" v="55"/>
+          <ac:spMkLst>
+            <pc:docMk/>
+            <pc:sldMk cId="3944304009" sldId="260"/>
+            <ac:spMk id="20" creationId="{382BDE6F-4A2E-4047-6EA3-CE1F499B386C}"/>
+          </ac:spMkLst>
+        </pc:spChg>
+        <pc:spChg chg="add">
+          <ac:chgData name="문명석/연구원/Cyber Security Engineering Unit" userId="S::myungsuk.moon@lge.com::fca14cfd-2a2a-44ce-bee2-3070c7406398" providerId="AD" clId="Web-{068C0D0F-062C-2C70-C144-7669E38D1DE4}" dt="2025-07-09T07:42:40.464" v="54"/>
+          <ac:spMkLst>
+            <pc:docMk/>
+            <pc:sldMk cId="3944304009" sldId="260"/>
+            <ac:spMk id="29" creationId="{9F70E1FE-AF49-234F-FECF-9733AD66FF7C}"/>
+          </ac:spMkLst>
+        </pc:spChg>
+        <pc:spChg chg="add">
+          <ac:chgData name="문명석/연구원/Cyber Security Engineering Unit" userId="S::myungsuk.moon@lge.com::fca14cfd-2a2a-44ce-bee2-3070c7406398" providerId="AD" clId="Web-{068C0D0F-062C-2C70-C144-7669E38D1DE4}" dt="2025-07-09T07:42:40.464" v="54"/>
+          <ac:spMkLst>
+            <pc:docMk/>
+            <pc:sldMk cId="3944304009" sldId="260"/>
+            <ac:spMk id="31" creationId="{DDF401AE-BE9D-7B23-3C6E-ABD5ED3218DA}"/>
+          </ac:spMkLst>
+        </pc:spChg>
+        <pc:spChg chg="add">
+          <ac:chgData name="문명석/연구원/Cyber Security Engineering Unit" userId="S::myungsuk.moon@lge.com::fca14cfd-2a2a-44ce-bee2-3070c7406398" providerId="AD" clId="Web-{068C0D0F-062C-2C70-C144-7669E38D1DE4}" dt="2025-07-09T07:42:40.464" v="54"/>
+          <ac:spMkLst>
+            <pc:docMk/>
+            <pc:sldMk cId="3944304009" sldId="260"/>
+            <ac:spMk id="33" creationId="{E553D7B0-340F-421B-9A3F-FE92762BA5AB}"/>
+          </ac:spMkLst>
+        </pc:spChg>
+        <pc:spChg chg="add">
+          <ac:chgData name="문명석/연구원/Cyber Security Engineering Unit" userId="S::myungsuk.moon@lge.com::fca14cfd-2a2a-44ce-bee2-3070c7406398" providerId="AD" clId="Web-{068C0D0F-062C-2C70-C144-7669E38D1DE4}" dt="2025-07-09T07:42:40.464" v="54"/>
+          <ac:spMkLst>
+            <pc:docMk/>
+            <pc:sldMk cId="3944304009" sldId="260"/>
+            <ac:spMk id="35" creationId="{18F5DA24-5932-F26E-1F63-D1F8338352CE}"/>
+          </ac:spMkLst>
+        </pc:spChg>
+        <pc:spChg chg="add mod">
+          <ac:chgData name="문명석/연구원/Cyber Security Engineering Unit" userId="S::myungsuk.moon@lge.com::fca14cfd-2a2a-44ce-bee2-3070c7406398" providerId="AD" clId="Web-{068C0D0F-062C-2C70-C144-7669E38D1DE4}" dt="2025-07-09T07:48:05.768" v="88" actId="1076"/>
+          <ac:spMkLst>
+            <pc:docMk/>
+            <pc:sldMk cId="3944304009" sldId="260"/>
+            <ac:spMk id="37" creationId="{AD4348E1-D84A-EE5D-EFBB-DA5B0918E772}"/>
+          </ac:spMkLst>
+        </pc:spChg>
+        <pc:spChg chg="add mod">
+          <ac:chgData name="문명석/연구원/Cyber Security Engineering Unit" userId="S::myungsuk.moon@lge.com::fca14cfd-2a2a-44ce-bee2-3070c7406398" providerId="AD" clId="Web-{068C0D0F-062C-2C70-C144-7669E38D1DE4}" dt="2025-07-09T07:54:12.886" v="193" actId="1076"/>
+          <ac:spMkLst>
+            <pc:docMk/>
+            <pc:sldMk cId="3944304009" sldId="260"/>
+            <ac:spMk id="40" creationId="{8AAFF94B-2699-E7CC-F651-00E34366A5F5}"/>
+          </ac:spMkLst>
+        </pc:spChg>
+        <pc:spChg chg="add del mod">
+          <ac:chgData name="문명석/연구원/Cyber Security Engineering Unit" userId="S::myungsuk.moon@lge.com::fca14cfd-2a2a-44ce-bee2-3070c7406398" providerId="AD" clId="Web-{068C0D0F-062C-2C70-C144-7669E38D1DE4}" dt="2025-07-09T07:53:58.855" v="192"/>
+          <ac:spMkLst>
+            <pc:docMk/>
+            <pc:sldMk cId="3944304009" sldId="260"/>
+            <ac:spMk id="41" creationId="{E012F7B4-E72B-6650-C317-8A060ED3F7B7}"/>
+          </ac:spMkLst>
+        </pc:spChg>
+        <pc:spChg chg="add mod">
+          <ac:chgData name="문명석/연구원/Cyber Security Engineering Unit" userId="S::myungsuk.moon@lge.com::fca14cfd-2a2a-44ce-bee2-3070c7406398" providerId="AD" clId="Web-{068C0D0F-062C-2C70-C144-7669E38D1DE4}" dt="2025-07-09T07:53:55.761" v="191" actId="1076"/>
+          <ac:spMkLst>
+            <pc:docMk/>
+            <pc:sldMk cId="3944304009" sldId="260"/>
+            <ac:spMk id="42" creationId="{3680C96B-BD02-55BD-7DF8-B2770F39371E}"/>
+          </ac:spMkLst>
+        </pc:spChg>
+        <pc:spChg chg="add mod">
+          <ac:chgData name="문명석/연구원/Cyber Security Engineering Unit" userId="S::myungsuk.moon@lge.com::fca14cfd-2a2a-44ce-bee2-3070c7406398" providerId="AD" clId="Web-{068C0D0F-062C-2C70-C144-7669E38D1DE4}" dt="2025-07-09T08:37:42.635" v="671" actId="20577"/>
+          <ac:spMkLst>
+            <pc:docMk/>
+            <pc:sldMk cId="3944304009" sldId="260"/>
+            <ac:spMk id="43" creationId="{EDC35243-D38B-A0BB-8AA8-AB5AA7702B8E}"/>
+          </ac:spMkLst>
+        </pc:spChg>
+        <pc:spChg chg="add mod">
+          <ac:chgData name="문명석/연구원/Cyber Security Engineering Unit" userId="S::myungsuk.moon@lge.com::fca14cfd-2a2a-44ce-bee2-3070c7406398" providerId="AD" clId="Web-{068C0D0F-062C-2C70-C144-7669E38D1DE4}" dt="2025-07-09T08:06:28.263" v="275" actId="14100"/>
+          <ac:spMkLst>
+            <pc:docMk/>
+            <pc:sldMk cId="3944304009" sldId="260"/>
+            <ac:spMk id="44" creationId="{5ED2BCE5-D497-8DFC-8E77-ADFE0F2BAEDC}"/>
+          </ac:spMkLst>
+        </pc:spChg>
+        <pc:spChg chg="add mod">
+          <ac:chgData name="문명석/연구원/Cyber Security Engineering Unit" userId="S::myungsuk.moon@lge.com::fca14cfd-2a2a-44ce-bee2-3070c7406398" providerId="AD" clId="Web-{068C0D0F-062C-2C70-C144-7669E38D1DE4}" dt="2025-07-09T08:06:24.060" v="274" actId="14100"/>
+          <ac:spMkLst>
+            <pc:docMk/>
+            <pc:sldMk cId="3944304009" sldId="260"/>
+            <ac:spMk id="45" creationId="{A2FAF635-134B-1EA0-2516-B27CDC2DEB8F}"/>
+          </ac:spMkLst>
+        </pc:spChg>
+        <pc:spChg chg="mod">
+          <ac:chgData name="문명석/연구원/Cyber Security Engineering Unit" userId="S::myungsuk.moon@lge.com::fca14cfd-2a2a-44ce-bee2-3070c7406398" providerId="AD" clId="Web-{068C0D0F-062C-2C70-C144-7669E38D1DE4}" dt="2025-07-09T08:34:20.005" v="635" actId="20577"/>
+          <ac:spMkLst>
+            <pc:docMk/>
+            <pc:sldMk cId="3944304009" sldId="260"/>
+            <ac:spMk id="56" creationId="{8BF72CD8-CC15-8182-4723-4E68A8189E76}"/>
+          </ac:spMkLst>
+        </pc:spChg>
+        <pc:spChg chg="mod">
+          <ac:chgData name="문명석/연구원/Cyber Security Engineering Unit" userId="S::myungsuk.moon@lge.com::fca14cfd-2a2a-44ce-bee2-3070c7406398" providerId="AD" clId="Web-{068C0D0F-062C-2C70-C144-7669E38D1DE4}" dt="2025-07-09T08:22:59.646" v="382" actId="20577"/>
+          <ac:spMkLst>
+            <pc:docMk/>
+            <pc:sldMk cId="3944304009" sldId="260"/>
+            <ac:spMk id="57" creationId="{7657BBBE-B4B1-0E41-FC87-2EB3B66E467E}"/>
+          </ac:spMkLst>
+        </pc:spChg>
+        <pc:grpChg chg="del">
+          <ac:chgData name="문명석/연구원/Cyber Security Engineering Unit" userId="S::myungsuk.moon@lge.com::fca14cfd-2a2a-44ce-bee2-3070c7406398" providerId="AD" clId="Web-{068C0D0F-062C-2C70-C144-7669E38D1DE4}" dt="2025-07-09T07:43:04.074" v="68"/>
+          <ac:grpSpMkLst>
+            <pc:docMk/>
+            <pc:sldMk cId="3944304009" sldId="260"/>
+            <ac:grpSpMk id="7" creationId="{1190E180-DA75-F79B-2DAE-49D3353661DD}"/>
+          </ac:grpSpMkLst>
+        </pc:grpChg>
+        <pc:grpChg chg="del">
+          <ac:chgData name="문명석/연구원/Cyber Security Engineering Unit" userId="S::myungsuk.moon@lge.com::fca14cfd-2a2a-44ce-bee2-3070c7406398" providerId="AD" clId="Web-{068C0D0F-062C-2C70-C144-7669E38D1DE4}" dt="2025-07-09T07:43:04.058" v="66"/>
+          <ac:grpSpMkLst>
+            <pc:docMk/>
+            <pc:sldMk cId="3944304009" sldId="260"/>
+            <ac:grpSpMk id="9" creationId="{B54033A0-1002-0AF7-B9A9-0535F4812373}"/>
+          </ac:grpSpMkLst>
+        </pc:grpChg>
+        <pc:grpChg chg="del">
+          <ac:chgData name="문명석/연구원/Cyber Security Engineering Unit" userId="S::myungsuk.moon@lge.com::fca14cfd-2a2a-44ce-bee2-3070c7406398" providerId="AD" clId="Web-{068C0D0F-062C-2C70-C144-7669E38D1DE4}" dt="2025-07-09T07:43:04.058" v="65"/>
+          <ac:grpSpMkLst>
+            <pc:docMk/>
+            <pc:sldMk cId="3944304009" sldId="260"/>
+            <ac:grpSpMk id="10" creationId="{C4DE25D0-CE80-DB17-2A25-7B32860E5C0F}"/>
+          </ac:grpSpMkLst>
+        </pc:grpChg>
+        <pc:grpChg chg="del">
+          <ac:chgData name="문명석/연구원/Cyber Security Engineering Unit" userId="S::myungsuk.moon@lge.com::fca14cfd-2a2a-44ce-bee2-3070c7406398" providerId="AD" clId="Web-{068C0D0F-062C-2C70-C144-7669E38D1DE4}" dt="2025-07-09T07:43:04.058" v="64"/>
+          <ac:grpSpMkLst>
+            <pc:docMk/>
+            <pc:sldMk cId="3944304009" sldId="260"/>
+            <ac:grpSpMk id="11" creationId="{A55AFDF9-EE71-B06A-6484-05FA8909BDCC}"/>
+          </ac:grpSpMkLst>
+        </pc:grpChg>
+        <pc:grpChg chg="del">
+          <ac:chgData name="문명석/연구원/Cyber Security Engineering Unit" userId="S::myungsuk.moon@lge.com::fca14cfd-2a2a-44ce-bee2-3070c7406398" providerId="AD" clId="Web-{068C0D0F-062C-2C70-C144-7669E38D1DE4}" dt="2025-07-09T07:43:04.058" v="60"/>
+          <ac:grpSpMkLst>
+            <pc:docMk/>
+            <pc:sldMk cId="3944304009" sldId="260"/>
+            <ac:grpSpMk id="15" creationId="{1818C386-2CA4-3400-03B4-FBD3CE6DE0B5}"/>
+          </ac:grpSpMkLst>
+        </pc:grpChg>
+        <pc:grpChg chg="del">
+          <ac:chgData name="문명석/연구원/Cyber Security Engineering Unit" userId="S::myungsuk.moon@lge.com::fca14cfd-2a2a-44ce-bee2-3070c7406398" providerId="AD" clId="Web-{068C0D0F-062C-2C70-C144-7669E38D1DE4}" dt="2025-07-09T07:43:04.058" v="59"/>
+          <ac:grpSpMkLst>
+            <pc:docMk/>
+            <pc:sldMk cId="3944304009" sldId="260"/>
+            <ac:grpSpMk id="16" creationId="{53377587-24B1-D26E-92FC-33F25D73DB2C}"/>
+          </ac:grpSpMkLst>
+        </pc:grpChg>
+        <pc:grpChg chg="del">
+          <ac:chgData name="문명석/연구원/Cyber Security Engineering Unit" userId="S::myungsuk.moon@lge.com::fca14cfd-2a2a-44ce-bee2-3070c7406398" providerId="AD" clId="Web-{068C0D0F-062C-2C70-C144-7669E38D1DE4}" dt="2025-07-09T07:43:04.058" v="58"/>
+          <ac:grpSpMkLst>
+            <pc:docMk/>
+            <pc:sldMk cId="3944304009" sldId="260"/>
+            <ac:grpSpMk id="17" creationId="{08F6C134-43A4-23FB-79A7-1EDD7A15DD92}"/>
+          </ac:grpSpMkLst>
+        </pc:grpChg>
+        <pc:grpChg chg="del">
+          <ac:chgData name="문명석/연구원/Cyber Security Engineering Unit" userId="S::myungsuk.moon@lge.com::fca14cfd-2a2a-44ce-bee2-3070c7406398" providerId="AD" clId="Web-{068C0D0F-062C-2C70-C144-7669E38D1DE4}" dt="2025-07-09T07:43:04.058" v="57"/>
+          <ac:grpSpMkLst>
+            <pc:docMk/>
+            <pc:sldMk cId="3944304009" sldId="260"/>
+            <ac:grpSpMk id="18" creationId="{49476E39-E9CB-A6FC-4583-DF6E05BD6C96}"/>
+          </ac:grpSpMkLst>
+        </pc:grpChg>
+        <pc:picChg chg="add mod">
+          <ac:chgData name="문명석/연구원/Cyber Security Engineering Unit" userId="S::myungsuk.moon@lge.com::fca14cfd-2a2a-44ce-bee2-3070c7406398" providerId="AD" clId="Web-{068C0D0F-062C-2C70-C144-7669E38D1DE4}" dt="2025-07-09T08:19:51.969" v="335" actId="1076"/>
+          <ac:picMkLst>
+            <pc:docMk/>
+            <pc:sldMk cId="3944304009" sldId="260"/>
+            <ac:picMk id="4" creationId="{3C18219B-6F60-6F61-0DF2-F2BF224DE84E}"/>
+          </ac:picMkLst>
+        </pc:picChg>
+        <pc:picChg chg="add del mod">
+          <ac:chgData name="문명석/연구원/Cyber Security Engineering Unit" userId="S::myungsuk.moon@lge.com::fca14cfd-2a2a-44ce-bee2-3070c7406398" providerId="AD" clId="Web-{068C0D0F-062C-2C70-C144-7669E38D1DE4}" dt="2025-07-09T07:34:31.546" v="16"/>
+          <ac:picMkLst>
+            <pc:docMk/>
+            <pc:sldMk cId="3944304009" sldId="260"/>
+            <ac:picMk id="4" creationId="{635BA432-43C2-06A4-7532-C170A6B68FCE}"/>
+          </ac:picMkLst>
+        </pc:picChg>
+        <pc:picChg chg="add del mod">
+          <ac:chgData name="문명석/연구원/Cyber Security Engineering Unit" userId="S::myungsuk.moon@lge.com::fca14cfd-2a2a-44ce-bee2-3070c7406398" providerId="AD" clId="Web-{068C0D0F-062C-2C70-C144-7669E38D1DE4}" dt="2025-07-09T07:43:04.074" v="69"/>
+          <ac:picMkLst>
+            <pc:docMk/>
+            <pc:sldMk cId="3944304009" sldId="260"/>
+            <ac:picMk id="5" creationId="{B3910009-D156-7ED6-9B40-C301A2FCDB93}"/>
+          </ac:picMkLst>
+        </pc:picChg>
+        <pc:picChg chg="add mod">
+          <ac:chgData name="문명석/연구원/Cyber Security Engineering Unit" userId="S::myungsuk.moon@lge.com::fca14cfd-2a2a-44ce-bee2-3070c7406398" providerId="AD" clId="Web-{068C0D0F-062C-2C70-C144-7669E38D1DE4}" dt="2025-07-09T08:22:24.239" v="359" actId="1076"/>
+          <ac:picMkLst>
+            <pc:docMk/>
+            <pc:sldMk cId="3944304009" sldId="260"/>
+            <ac:picMk id="5" creationId="{BDB5A6F7-679E-D9CA-C87A-F546EF257FA6}"/>
+          </ac:picMkLst>
+        </pc:picChg>
+        <pc:picChg chg="del">
+          <ac:chgData name="문명석/연구원/Cyber Security Engineering Unit" userId="S::myungsuk.moon@lge.com::fca14cfd-2a2a-44ce-bee2-3070c7406398" providerId="AD" clId="Web-{068C0D0F-062C-2C70-C144-7669E38D1DE4}" dt="2025-07-09T06:02:06.983" v="2"/>
+          <ac:picMkLst>
+            <pc:docMk/>
+            <pc:sldMk cId="3944304009" sldId="260"/>
+            <ac:picMk id="10" creationId="{32869C07-8EA0-BED9-D84F-576DE6049660}"/>
+          </ac:picMkLst>
+        </pc:picChg>
+        <pc:picChg chg="add">
+          <ac:chgData name="문명석/연구원/Cyber Security Engineering Unit" userId="S::myungsuk.moon@lge.com::fca14cfd-2a2a-44ce-bee2-3070c7406398" providerId="AD" clId="Web-{068C0D0F-062C-2C70-C144-7669E38D1DE4}" dt="2025-07-09T07:42:40.464" v="54"/>
+          <ac:picMkLst>
+            <pc:docMk/>
+            <pc:sldMk cId="3944304009" sldId="260"/>
+            <ac:picMk id="23" creationId="{D4CD15B1-F457-95E2-E0F5-0A183FB16DDE}"/>
+          </ac:picMkLst>
+        </pc:picChg>
+        <pc:picChg chg="add">
+          <ac:chgData name="문명석/연구원/Cyber Security Engineering Unit" userId="S::myungsuk.moon@lge.com::fca14cfd-2a2a-44ce-bee2-3070c7406398" providerId="AD" clId="Web-{068C0D0F-062C-2C70-C144-7669E38D1DE4}" dt="2025-07-09T07:42:40.464" v="54"/>
+          <ac:picMkLst>
+            <pc:docMk/>
+            <pc:sldMk cId="3944304009" sldId="260"/>
+            <ac:picMk id="26" creationId="{7BBE46F4-D96B-4D37-0A35-A19E1437BE33}"/>
+          </ac:picMkLst>
+        </pc:picChg>
+        <pc:picChg chg="add">
+          <ac:chgData name="문명석/연구원/Cyber Security Engineering Unit" userId="S::myungsuk.moon@lge.com::fca14cfd-2a2a-44ce-bee2-3070c7406398" providerId="AD" clId="Web-{068C0D0F-062C-2C70-C144-7669E38D1DE4}" dt="2025-07-09T07:42:40.464" v="54"/>
+          <ac:picMkLst>
+            <pc:docMk/>
+            <pc:sldMk cId="3944304009" sldId="260"/>
+            <ac:picMk id="27" creationId="{F57A37B1-67D2-1D35-974C-CEB6670FD4F2}"/>
+          </ac:picMkLst>
+        </pc:picChg>
+        <pc:picChg chg="add">
+          <ac:chgData name="문명석/연구원/Cyber Security Engineering Unit" userId="S::myungsuk.moon@lge.com::fca14cfd-2a2a-44ce-bee2-3070c7406398" providerId="AD" clId="Web-{068C0D0F-062C-2C70-C144-7669E38D1DE4}" dt="2025-07-09T07:42:40.464" v="54"/>
+          <ac:picMkLst>
+            <pc:docMk/>
+            <pc:sldMk cId="3944304009" sldId="260"/>
+            <ac:picMk id="36" creationId="{59AF564B-A21F-849C-CF6B-20892FD133C9}"/>
+          </ac:picMkLst>
+        </pc:picChg>
+        <pc:picChg chg="add mod modCrop">
+          <ac:chgData name="문명석/연구원/Cyber Security Engineering Unit" userId="S::myungsuk.moon@lge.com::fca14cfd-2a2a-44ce-bee2-3070c7406398" providerId="AD" clId="Web-{068C0D0F-062C-2C70-C144-7669E38D1DE4}" dt="2025-07-09T08:19:22.016" v="328" actId="1076"/>
+          <ac:picMkLst>
+            <pc:docMk/>
+            <pc:sldMk cId="3944304009" sldId="260"/>
+            <ac:picMk id="38" creationId="{B3BF3DE6-5942-3393-2A3A-8C66D736F41D}"/>
+          </ac:picMkLst>
+        </pc:picChg>
+        <pc:cxnChg chg="del">
+          <ac:chgData name="문명석/연구원/Cyber Security Engineering Unit" userId="S::myungsuk.moon@lge.com::fca14cfd-2a2a-44ce-bee2-3070c7406398" providerId="AD" clId="Web-{068C0D0F-062C-2C70-C144-7669E38D1DE4}" dt="2025-07-09T07:43:04.058" v="67"/>
+          <ac:cxnSpMkLst>
+            <pc:docMk/>
+            <pc:sldMk cId="3944304009" sldId="260"/>
+            <ac:cxnSpMk id="8" creationId="{2B47EE8E-9545-62F5-67C2-73D3955D2E79}"/>
+          </ac:cxnSpMkLst>
+        </pc:cxnChg>
+        <pc:cxnChg chg="del">
+          <ac:chgData name="문명석/연구원/Cyber Security Engineering Unit" userId="S::myungsuk.moon@lge.com::fca14cfd-2a2a-44ce-bee2-3070c7406398" providerId="AD" clId="Web-{068C0D0F-062C-2C70-C144-7669E38D1DE4}" dt="2025-07-09T07:43:04.058" v="63"/>
+          <ac:cxnSpMkLst>
+            <pc:docMk/>
+            <pc:sldMk cId="3944304009" sldId="260"/>
+            <ac:cxnSpMk id="12" creationId="{20AE832D-66E3-1DE0-C31C-9DF87FF8A6BE}"/>
+          </ac:cxnSpMkLst>
+        </pc:cxnChg>
+        <pc:cxnChg chg="del">
+          <ac:chgData name="문명석/연구원/Cyber Security Engineering Unit" userId="S::myungsuk.moon@lge.com::fca14cfd-2a2a-44ce-bee2-3070c7406398" providerId="AD" clId="Web-{068C0D0F-062C-2C70-C144-7669E38D1DE4}" dt="2025-07-09T07:43:04.058" v="62"/>
+          <ac:cxnSpMkLst>
+            <pc:docMk/>
+            <pc:sldMk cId="3944304009" sldId="260"/>
+            <ac:cxnSpMk id="13" creationId="{9EF92270-59EB-4B21-CC65-5253A787B563}"/>
+          </ac:cxnSpMkLst>
+        </pc:cxnChg>
+        <pc:cxnChg chg="del">
+          <ac:chgData name="문명석/연구원/Cyber Security Engineering Unit" userId="S::myungsuk.moon@lge.com::fca14cfd-2a2a-44ce-bee2-3070c7406398" providerId="AD" clId="Web-{068C0D0F-062C-2C70-C144-7669E38D1DE4}" dt="2025-07-09T07:43:04.058" v="61"/>
+          <ac:cxnSpMkLst>
+            <pc:docMk/>
+            <pc:sldMk cId="3944304009" sldId="260"/>
+            <ac:cxnSpMk id="14" creationId="{2085EEA0-9CB6-AD7D-7AFF-73CDE8CAEAC6}"/>
+          </ac:cxnSpMkLst>
+        </pc:cxnChg>
+      </pc:sldChg>
+      <pc:sldChg chg="addSp delSp modSp add replId">
+        <pc:chgData name="문명석/연구원/Cyber Security Engineering Unit" userId="S::myungsuk.moon@lge.com::fca14cfd-2a2a-44ce-bee2-3070c7406398" providerId="AD" clId="Web-{068C0D0F-062C-2C70-C144-7669E38D1DE4}" dt="2025-07-09T08:33:45.567" v="615" actId="1076"/>
+        <pc:sldMkLst>
+          <pc:docMk/>
+          <pc:sldMk cId="3287572541" sldId="261"/>
+        </pc:sldMkLst>
+        <pc:spChg chg="add mod">
+          <ac:chgData name="문명석/연구원/Cyber Security Engineering Unit" userId="S::myungsuk.moon@lge.com::fca14cfd-2a2a-44ce-bee2-3070c7406398" providerId="AD" clId="Web-{068C0D0F-062C-2C70-C144-7669E38D1DE4}" dt="2025-07-09T08:18:14.045" v="311" actId="20577"/>
+          <ac:spMkLst>
+            <pc:docMk/>
+            <pc:sldMk cId="3287572541" sldId="261"/>
+            <ac:spMk id="3" creationId="{90826EC9-E3C4-B06F-D65B-2465FAB7A3C3}"/>
+          </ac:spMkLst>
+        </pc:spChg>
+        <pc:spChg chg="add del mod">
+          <ac:chgData name="문명석/연구원/Cyber Security Engineering Unit" userId="S::myungsuk.moon@lge.com::fca14cfd-2a2a-44ce-bee2-3070c7406398" providerId="AD" clId="Web-{068C0D0F-062C-2C70-C144-7669E38D1DE4}" dt="2025-07-09T08:05:33.106" v="264"/>
+          <ac:spMkLst>
+            <pc:docMk/>
+            <pc:sldMk cId="3287572541" sldId="261"/>
+            <ac:spMk id="4" creationId="{629DB8B1-D29E-2D1B-2CB4-96FDB21D4389}"/>
+          </ac:spMkLst>
+        </pc:spChg>
+        <pc:spChg chg="add mod">
+          <ac:chgData name="문명석/연구원/Cyber Security Engineering Unit" userId="S::myungsuk.moon@lge.com::fca14cfd-2a2a-44ce-bee2-3070c7406398" providerId="AD" clId="Web-{068C0D0F-062C-2C70-C144-7669E38D1DE4}" dt="2025-07-09T08:17:49.295" v="303" actId="20577"/>
+          <ac:spMkLst>
+            <pc:docMk/>
+            <pc:sldMk cId="3287572541" sldId="261"/>
+            <ac:spMk id="5" creationId="{4935A44E-BA97-21C6-321F-2FC4B846D390}"/>
+          </ac:spMkLst>
+        </pc:spChg>
+        <pc:spChg chg="add del">
+          <ac:chgData name="문명석/연구원/Cyber Security Engineering Unit" userId="S::myungsuk.moon@lge.com::fca14cfd-2a2a-44ce-bee2-3070c7406398" providerId="AD" clId="Web-{068C0D0F-062C-2C70-C144-7669E38D1DE4}" dt="2025-07-09T08:06:44.545" v="278"/>
+          <ac:spMkLst>
+            <pc:docMk/>
+            <pc:sldMk cId="3287572541" sldId="261"/>
+            <ac:spMk id="7" creationId="{24F3A3A4-1411-2EE3-8561-854078E5E826}"/>
+          </ac:spMkLst>
+        </pc:spChg>
+        <pc:spChg chg="del mod">
+          <ac:chgData name="문명석/연구원/Cyber Security Engineering Unit" userId="S::myungsuk.moon@lge.com::fca14cfd-2a2a-44ce-bee2-3070c7406398" providerId="AD" clId="Web-{068C0D0F-062C-2C70-C144-7669E38D1DE4}" dt="2025-07-09T08:18:36.077" v="319"/>
+          <ac:spMkLst>
+            <pc:docMk/>
+            <pc:sldMk cId="3287572541" sldId="261"/>
+            <ac:spMk id="8" creationId="{0CE0E645-3902-4100-66E5-1BBC831410A9}"/>
+          </ac:spMkLst>
+        </pc:spChg>
+        <pc:spChg chg="mod">
+          <ac:chgData name="문명석/연구원/Cyber Security Engineering Unit" userId="S::myungsuk.moon@lge.com::fca14cfd-2a2a-44ce-bee2-3070c7406398" providerId="AD" clId="Web-{068C0D0F-062C-2C70-C144-7669E38D1DE4}" dt="2025-07-09T08:17:36.966" v="297" actId="20577"/>
+          <ac:spMkLst>
+            <pc:docMk/>
+            <pc:sldMk cId="3287572541" sldId="261"/>
+            <ac:spMk id="37" creationId="{8E33F961-C3CA-8FF2-04BB-00CDCD23AE20}"/>
+          </ac:spMkLst>
+        </pc:spChg>
+        <pc:spChg chg="mod">
+          <ac:chgData name="문명석/연구원/Cyber Security Engineering Unit" userId="S::myungsuk.moon@lge.com::fca14cfd-2a2a-44ce-bee2-3070c7406398" providerId="AD" clId="Web-{068C0D0F-062C-2C70-C144-7669E38D1DE4}" dt="2025-07-09T08:31:03.235" v="579" actId="20577"/>
+          <ac:spMkLst>
+            <pc:docMk/>
+            <pc:sldMk cId="3287572541" sldId="261"/>
+            <ac:spMk id="40" creationId="{8D3A6D4F-2616-B2E7-F5C5-C3E62725CC4E}"/>
+          </ac:spMkLst>
+        </pc:spChg>
+        <pc:spChg chg="del mod">
+          <ac:chgData name="문명석/연구원/Cyber Security Engineering Unit" userId="S::myungsuk.moon@lge.com::fca14cfd-2a2a-44ce-bee2-3070c7406398" providerId="AD" clId="Web-{068C0D0F-062C-2C70-C144-7669E38D1DE4}" dt="2025-07-09T08:05:10.136" v="258"/>
+          <ac:spMkLst>
+            <pc:docMk/>
+            <pc:sldMk cId="3287572541" sldId="261"/>
+            <ac:spMk id="44" creationId="{F90B7E09-78C3-C380-08C1-BD844A8852B6}"/>
+          </ac:spMkLst>
+        </pc:spChg>
+        <pc:spChg chg="del">
+          <ac:chgData name="문명석/연구원/Cyber Security Engineering Unit" userId="S::myungsuk.moon@lge.com::fca14cfd-2a2a-44ce-bee2-3070c7406398" providerId="AD" clId="Web-{068C0D0F-062C-2C70-C144-7669E38D1DE4}" dt="2025-07-09T08:04:59.808" v="255"/>
+          <ac:spMkLst>
+            <pc:docMk/>
+            <pc:sldMk cId="3287572541" sldId="261"/>
+            <ac:spMk id="45" creationId="{98DDCF1B-1B09-C6E9-F185-1D2520AF9B76}"/>
+          </ac:spMkLst>
+        </pc:spChg>
+        <pc:spChg chg="mod ord">
+          <ac:chgData name="문명석/연구원/Cyber Security Engineering Unit" userId="S::myungsuk.moon@lge.com::fca14cfd-2a2a-44ce-bee2-3070c7406398" providerId="AD" clId="Web-{068C0D0F-062C-2C70-C144-7669E38D1DE4}" dt="2025-07-09T08:33:45.567" v="615" actId="1076"/>
+          <ac:spMkLst>
+            <pc:docMk/>
+            <pc:sldMk cId="3287572541" sldId="261"/>
+            <ac:spMk id="69" creationId="{F71AAE28-AF45-C246-F0E3-1C4E945B00DD}"/>
+          </ac:spMkLst>
+        </pc:spChg>
+        <pc:spChg chg="add mod">
+          <ac:chgData name="문명석/연구원/Cyber Security Engineering Unit" userId="S::myungsuk.moon@lge.com::fca14cfd-2a2a-44ce-bee2-3070c7406398" providerId="AD" clId="Web-{068C0D0F-062C-2C70-C144-7669E38D1DE4}" dt="2025-07-09T08:26:49.135" v="472" actId="20577"/>
+          <ac:spMkLst>
+            <pc:docMk/>
+            <pc:sldMk cId="3287572541" sldId="261"/>
+            <ac:spMk id="73" creationId="{4DCC1A2B-63EB-E4C4-ECFE-2828D1A70DA2}"/>
+          </ac:spMkLst>
+        </pc:spChg>
+        <pc:spChg chg="add mod">
+          <ac:chgData name="문명석/연구원/Cyber Security Engineering Unit" userId="S::myungsuk.moon@lge.com::fca14cfd-2a2a-44ce-bee2-3070c7406398" providerId="AD" clId="Web-{068C0D0F-062C-2C70-C144-7669E38D1DE4}" dt="2025-07-09T08:26:51.198" v="473" actId="20577"/>
+          <ac:spMkLst>
+            <pc:docMk/>
+            <pc:sldMk cId="3287572541" sldId="261"/>
+            <ac:spMk id="74" creationId="{B694B6A9-0640-6A8B-2584-F042C10833DE}"/>
+          </ac:spMkLst>
+        </pc:spChg>
+        <pc:spChg chg="add mod">
+          <ac:chgData name="문명석/연구원/Cyber Security Engineering Unit" userId="S::myungsuk.moon@lge.com::fca14cfd-2a2a-44ce-bee2-3070c7406398" providerId="AD" clId="Web-{068C0D0F-062C-2C70-C144-7669E38D1DE4}" dt="2025-07-09T08:29:52.327" v="560" actId="20577"/>
+          <ac:spMkLst>
+            <pc:docMk/>
+            <pc:sldMk cId="3287572541" sldId="261"/>
+            <ac:spMk id="75" creationId="{3C7186DF-EF59-9A20-9223-42F63F9DF243}"/>
+          </ac:spMkLst>
+        </pc:spChg>
+        <pc:spChg chg="add mod">
+          <ac:chgData name="문명석/연구원/Cyber Security Engineering Unit" userId="S::myungsuk.moon@lge.com::fca14cfd-2a2a-44ce-bee2-3070c7406398" providerId="AD" clId="Web-{068C0D0F-062C-2C70-C144-7669E38D1DE4}" dt="2025-07-09T08:33:06.613" v="604" actId="20577"/>
+          <ac:spMkLst>
+            <pc:docMk/>
+            <pc:sldMk cId="3287572541" sldId="261"/>
+            <ac:spMk id="76" creationId="{D9AA30A5-0AD5-1D35-6991-C932EF93CB9C}"/>
+          </ac:spMkLst>
+        </pc:spChg>
+        <pc:picChg chg="del">
+          <ac:chgData name="문명석/연구원/Cyber Security Engineering Unit" userId="S::myungsuk.moon@lge.com::fca14cfd-2a2a-44ce-bee2-3070c7406398" providerId="AD" clId="Web-{068C0D0F-062C-2C70-C144-7669E38D1DE4}" dt="2025-07-09T08:05:22.793" v="259"/>
+          <ac:picMkLst>
+            <pc:docMk/>
+            <pc:sldMk cId="3287572541" sldId="261"/>
+            <ac:picMk id="38" creationId="{F0AF44EA-B751-0D48-D52A-AE31522978C0}"/>
+          </ac:picMkLst>
+        </pc:picChg>
+        <pc:picChg chg="add mod">
+          <ac:chgData name="문명석/연구원/Cyber Security Engineering Unit" userId="S::myungsuk.moon@lge.com::fca14cfd-2a2a-44ce-bee2-3070c7406398" providerId="AD" clId="Web-{068C0D0F-062C-2C70-C144-7669E38D1DE4}" dt="2025-07-09T08:21:29.175" v="348" actId="1076"/>
+          <ac:picMkLst>
+            <pc:docMk/>
+            <pc:sldMk cId="3287572541" sldId="261"/>
+            <ac:picMk id="67" creationId="{594A9D24-19E7-38BE-7969-5D2EAB3A8372}"/>
+          </ac:picMkLst>
+        </pc:picChg>
+        <pc:picChg chg="add mod">
+          <ac:chgData name="문명석/연구원/Cyber Security Engineering Unit" userId="S::myungsuk.moon@lge.com::fca14cfd-2a2a-44ce-bee2-3070c7406398" providerId="AD" clId="Web-{068C0D0F-062C-2C70-C144-7669E38D1DE4}" dt="2025-07-09T08:21:27.034" v="347" actId="1076"/>
+          <ac:picMkLst>
+            <pc:docMk/>
+            <pc:sldMk cId="3287572541" sldId="261"/>
+            <ac:picMk id="71" creationId="{EC11D9A4-49FC-327F-6A44-6105451A3869}"/>
+          </ac:picMkLst>
+        </pc:picChg>
+        <pc:picChg chg="add mod">
+          <ac:chgData name="문명석/연구원/Cyber Security Engineering Unit" userId="S::myungsuk.moon@lge.com::fca14cfd-2a2a-44ce-bee2-3070c7406398" providerId="AD" clId="Web-{068C0D0F-062C-2C70-C144-7669E38D1DE4}" dt="2025-07-09T08:28:31.075" v="529" actId="1076"/>
+          <ac:picMkLst>
+            <pc:docMk/>
+            <pc:sldMk cId="3287572541" sldId="261"/>
+            <ac:picMk id="72" creationId="{5800B87A-D3DC-28FE-0BD4-743CB8EFD7B5}"/>
+          </ac:picMkLst>
+        </pc:picChg>
+      </pc:sldChg>
+      <pc:sldChg chg="add del replId">
+        <pc:chgData name="문명석/연구원/Cyber Security Engineering Unit" userId="S::myungsuk.moon@lge.com::fca14cfd-2a2a-44ce-bee2-3070c7406398" providerId="AD" clId="Web-{068C0D0F-062C-2C70-C144-7669E38D1DE4}" dt="2025-07-09T08:01:05.130" v="236"/>
+        <pc:sldMkLst>
+          <pc:docMk/>
+          <pc:sldMk cId="3464342232" sldId="261"/>
+        </pc:sldMkLst>
+      </pc:sldChg>
+      <pc:sldChg chg="new del mod setBg">
+        <pc:chgData name="문명석/연구원/Cyber Security Engineering Unit" userId="S::myungsuk.moon@lge.com::fca14cfd-2a2a-44ce-bee2-3070c7406398" providerId="AD" clId="Web-{068C0D0F-062C-2C70-C144-7669E38D1DE4}" dt="2025-07-09T08:02:50.680" v="242"/>
+        <pc:sldMkLst>
+          <pc:docMk/>
+          <pc:sldMk cId="3998846094" sldId="261"/>
+        </pc:sldMkLst>
+      </pc:sldChg>
+      <pc:sldMasterChg chg="addSp">
+        <pc:chgData name="문명석/연구원/Cyber Security Engineering Unit" userId="S::myungsuk.moon@lge.com::fca14cfd-2a2a-44ce-bee2-3070c7406398" providerId="AD" clId="Web-{068C0D0F-062C-2C70-C144-7669E38D1DE4}" dt="2025-07-09T04:21:42.470" v="0" actId="33475"/>
+        <pc:sldMasterMkLst>
+          <pc:docMk/>
+          <pc:sldMasterMk cId="897976641" sldId="2147483663"/>
+        </pc:sldMasterMkLst>
+        <pc:spChg chg="add">
+          <ac:chgData name="문명석/연구원/Cyber Security Engineering Unit" userId="S::myungsuk.moon@lge.com::fca14cfd-2a2a-44ce-bee2-3070c7406398" providerId="AD" clId="Web-{068C0D0F-062C-2C70-C144-7669E38D1DE4}" dt="2025-07-09T04:21:42.470" v="0" actId="33475"/>
+          <ac:spMkLst>
+            <pc:docMk/>
+            <pc:sldMasterMk cId="897976641" sldId="2147483663"/>
+            <ac:spMk id="8" creationId="{05ED8D2B-9636-2C19-3D17-FC704189FBEA}"/>
+          </ac:spMkLst>
+        </pc:spChg>
+      </pc:sldMasterChg>
+    </pc:docChg>
+  </pc:docChgLst>
+  <pc:docChgLst>
+    <pc:chgData name="공하영/연구원/오디오SW개발팀" userId="S::hayoung.gong@lge.com::54f8b2b8-100a-4714-9013-22e897ef1b2e" providerId="AD" clId="Web-{EB63EF9C-15B9-9A72-AB5A-A33A61B7A418}"/>
+    <pc:docChg chg="modSld">
+      <pc:chgData name="공하영/연구원/오디오SW개발팀" userId="S::hayoung.gong@lge.com::54f8b2b8-100a-4714-9013-22e897ef1b2e" providerId="AD" clId="Web-{EB63EF9C-15B9-9A72-AB5A-A33A61B7A418}" dt="2025-07-09T08:34:51.002" v="374" actId="14100"/>
+      <pc:docMkLst>
+        <pc:docMk/>
+      </pc:docMkLst>
+      <pc:sldChg chg="addSp delSp modSp">
+        <pc:chgData name="공하영/연구원/오디오SW개발팀" userId="S::hayoung.gong@lge.com::54f8b2b8-100a-4714-9013-22e897ef1b2e" providerId="AD" clId="Web-{EB63EF9C-15B9-9A72-AB5A-A33A61B7A418}" dt="2025-07-09T08:34:51.002" v="374" actId="14100"/>
+        <pc:sldMkLst>
+          <pc:docMk/>
+          <pc:sldMk cId="3287572541" sldId="261"/>
+        </pc:sldMkLst>
+        <pc:spChg chg="mod">
+          <ac:chgData name="공하영/연구원/오디오SW개발팀" userId="S::hayoung.gong@lge.com::54f8b2b8-100a-4714-9013-22e897ef1b2e" providerId="AD" clId="Web-{EB63EF9C-15B9-9A72-AB5A-A33A61B7A418}" dt="2025-07-09T08:10:52.400" v="81" actId="20577"/>
+          <ac:spMkLst>
+            <pc:docMk/>
+            <pc:sldMk cId="3287572541" sldId="261"/>
+            <ac:spMk id="3" creationId="{90826EC9-E3C4-B06F-D65B-2465FAB7A3C3}"/>
+          </ac:spMkLst>
+        </pc:spChg>
+        <pc:spChg chg="add del mod">
+          <ac:chgData name="공하영/연구원/오디오SW개발팀" userId="S::hayoung.gong@lge.com::54f8b2b8-100a-4714-9013-22e897ef1b2e" providerId="AD" clId="Web-{EB63EF9C-15B9-9A72-AB5A-A33A61B7A418}" dt="2025-07-09T08:10:38.478" v="62" actId="20577"/>
+          <ac:spMkLst>
+            <pc:docMk/>
+            <pc:sldMk cId="3287572541" sldId="261"/>
+            <ac:spMk id="5" creationId="{4935A44E-BA97-21C6-321F-2FC4B846D390}"/>
+          </ac:spMkLst>
+        </pc:spChg>
+        <pc:spChg chg="add del">
+          <ac:chgData name="공하영/연구원/오디오SW개발팀" userId="S::hayoung.gong@lge.com::54f8b2b8-100a-4714-9013-22e897ef1b2e" providerId="AD" clId="Web-{EB63EF9C-15B9-9A72-AB5A-A33A61B7A418}" dt="2025-07-09T08:09:13.257" v="8"/>
+          <ac:spMkLst>
+            <pc:docMk/>
+            <pc:sldMk cId="3287572541" sldId="261"/>
+            <ac:spMk id="6" creationId="{C319F8EE-7D88-5F4C-6DB3-D39A697A8B53}"/>
+          </ac:spMkLst>
+        </pc:spChg>
+        <pc:spChg chg="add">
+          <ac:chgData name="공하영/연구원/오디오SW개발팀" userId="S::hayoung.gong@lge.com::54f8b2b8-100a-4714-9013-22e897ef1b2e" providerId="AD" clId="Web-{EB63EF9C-15B9-9A72-AB5A-A33A61B7A418}" dt="2025-07-09T08:08:52.460" v="0"/>
+          <ac:spMkLst>
+            <pc:docMk/>
+            <pc:sldMk cId="3287572541" sldId="261"/>
+            <ac:spMk id="8" creationId="{0CE0E645-3902-4100-66E5-1BBC831410A9}"/>
+          </ac:spMkLst>
+        </pc:spChg>
+        <pc:spChg chg="del">
+          <ac:chgData name="공하영/연구원/오디오SW개발팀" userId="S::hayoung.gong@lge.com::54f8b2b8-100a-4714-9013-22e897ef1b2e" providerId="AD" clId="Web-{EB63EF9C-15B9-9A72-AB5A-A33A61B7A418}" dt="2025-07-09T08:09:14.992" v="9"/>
+          <ac:spMkLst>
+            <pc:docMk/>
+            <pc:sldMk cId="3287572541" sldId="261"/>
+            <ac:spMk id="10" creationId="{B0FB6779-AF62-6095-1148-0ADB9A06D131}"/>
+          </ac:spMkLst>
+        </pc:spChg>
+        <pc:spChg chg="add del">
+          <ac:chgData name="공하영/연구원/오디오SW개발팀" userId="S::hayoung.gong@lge.com::54f8b2b8-100a-4714-9013-22e897ef1b2e" providerId="AD" clId="Web-{EB63EF9C-15B9-9A72-AB5A-A33A61B7A418}" dt="2025-07-09T08:09:18.601" v="13"/>
+          <ac:spMkLst>
+            <pc:docMk/>
+            <pc:sldMk cId="3287572541" sldId="261"/>
+            <ac:spMk id="12" creationId="{00C1F5FE-ABCB-61BA-EEF8-664724A8A138}"/>
+          </ac:spMkLst>
+        </pc:spChg>
+        <pc:spChg chg="add del">
+          <ac:chgData name="공하영/연구원/오디오SW개발팀" userId="S::hayoung.gong@lge.com::54f8b2b8-100a-4714-9013-22e897ef1b2e" providerId="AD" clId="Web-{EB63EF9C-15B9-9A72-AB5A-A33A61B7A418}" dt="2025-07-09T08:09:18.601" v="12"/>
+          <ac:spMkLst>
+            <pc:docMk/>
+            <pc:sldMk cId="3287572541" sldId="261"/>
+            <ac:spMk id="13" creationId="{97A8B1D4-CA75-71F9-4FCB-F4B2AC97775D}"/>
+          </ac:spMkLst>
+        </pc:spChg>
+        <pc:spChg chg="add del">
+          <ac:chgData name="공하영/연구원/오디오SW개발팀" userId="S::hayoung.gong@lge.com::54f8b2b8-100a-4714-9013-22e897ef1b2e" providerId="AD" clId="Web-{EB63EF9C-15B9-9A72-AB5A-A33A61B7A418}" dt="2025-07-09T08:09:18.601" v="11"/>
+          <ac:spMkLst>
+            <pc:docMk/>
+            <pc:sldMk cId="3287572541" sldId="261"/>
+            <ac:spMk id="14" creationId="{E4B3FAFD-2BE7-9F9F-F02C-F101A95F1B45}"/>
+          </ac:spMkLst>
+        </pc:spChg>
+        <pc:spChg chg="add">
+          <ac:chgData name="공하영/연구원/오디오SW개발팀" userId="S::hayoung.gong@lge.com::54f8b2b8-100a-4714-9013-22e897ef1b2e" providerId="AD" clId="Web-{EB63EF9C-15B9-9A72-AB5A-A33A61B7A418}" dt="2025-07-09T08:08:52.460" v="0"/>
+          <ac:spMkLst>
+            <pc:docMk/>
+            <pc:sldMk cId="3287572541" sldId="261"/>
+            <ac:spMk id="25" creationId="{596EC956-9C58-1308-50D3-3AB1E38B74EE}"/>
+          </ac:spMkLst>
+        </pc:spChg>
+        <pc:spChg chg="add">
+          <ac:chgData name="공하영/연구원/오디오SW개발팀" userId="S::hayoung.gong@lge.com::54f8b2b8-100a-4714-9013-22e897ef1b2e" providerId="AD" clId="Web-{EB63EF9C-15B9-9A72-AB5A-A33A61B7A418}" dt="2025-07-09T08:08:52.460" v="0"/>
+          <ac:spMkLst>
+            <pc:docMk/>
+            <pc:sldMk cId="3287572541" sldId="261"/>
+            <ac:spMk id="27" creationId="{AE84C1A2-DDA9-80AB-FE7A-CE8F35F27E1C}"/>
+          </ac:spMkLst>
+        </pc:spChg>
+        <pc:spChg chg="add">
+          <ac:chgData name="공하영/연구원/오디오SW개발팀" userId="S::hayoung.gong@lge.com::54f8b2b8-100a-4714-9013-22e897ef1b2e" providerId="AD" clId="Web-{EB63EF9C-15B9-9A72-AB5A-A33A61B7A418}" dt="2025-07-09T08:08:52.460" v="0"/>
+          <ac:spMkLst>
+            <pc:docMk/>
+            <pc:sldMk cId="3287572541" sldId="261"/>
+            <ac:spMk id="29" creationId="{B1128918-35D6-DE6E-4AFF-0454CA460BE4}"/>
+          </ac:spMkLst>
+        </pc:spChg>
+        <pc:spChg chg="add">
+          <ac:chgData name="공하영/연구원/오디오SW개발팀" userId="S::hayoung.gong@lge.com::54f8b2b8-100a-4714-9013-22e897ef1b2e" providerId="AD" clId="Web-{EB63EF9C-15B9-9A72-AB5A-A33A61B7A418}" dt="2025-07-09T08:08:52.460" v="0"/>
+          <ac:spMkLst>
+            <pc:docMk/>
+            <pc:sldMk cId="3287572541" sldId="261"/>
+            <ac:spMk id="31" creationId="{D8140A98-A7F9-01BA-94C8-9C9E1E397747}"/>
+          </ac:spMkLst>
+        </pc:spChg>
+        <pc:spChg chg="add del mod">
+          <ac:chgData name="공하영/연구원/오디오SW개발팀" userId="S::hayoung.gong@lge.com::54f8b2b8-100a-4714-9013-22e897ef1b2e" providerId="AD" clId="Web-{EB63EF9C-15B9-9A72-AB5A-A33A61B7A418}" dt="2025-07-09T08:10:18.055" v="40" actId="20577"/>
+          <ac:spMkLst>
+            <pc:docMk/>
+            <pc:sldMk cId="3287572541" sldId="261"/>
+            <ac:spMk id="37" creationId="{8E33F961-C3CA-8FF2-04BB-00CDCD23AE20}"/>
+          </ac:spMkLst>
+        </pc:spChg>
+        <pc:spChg chg="del">
+          <ac:chgData name="공하영/연구원/오디오SW개발팀" userId="S::hayoung.gong@lge.com::54f8b2b8-100a-4714-9013-22e897ef1b2e" providerId="AD" clId="Web-{EB63EF9C-15B9-9A72-AB5A-A33A61B7A418}" dt="2025-07-09T08:09:21.039" v="14"/>
+          <ac:spMkLst>
+            <pc:docMk/>
+            <pc:sldMk cId="3287572541" sldId="261"/>
+            <ac:spMk id="43" creationId="{357B5576-E6DB-1A51-0BC7-D3651D2FA052}"/>
+          </ac:spMkLst>
+        </pc:spChg>
+        <pc:spChg chg="add">
+          <ac:chgData name="공하영/연구원/오디오SW개발팀" userId="S::hayoung.gong@lge.com::54f8b2b8-100a-4714-9013-22e897ef1b2e" providerId="AD" clId="Web-{EB63EF9C-15B9-9A72-AB5A-A33A61B7A418}" dt="2025-07-09T08:08:52.460" v="0"/>
+          <ac:spMkLst>
+            <pc:docMk/>
+            <pc:sldMk cId="3287572541" sldId="261"/>
+            <ac:spMk id="65" creationId="{191B7F4A-6CC4-228E-8823-63727ADFB9C1}"/>
+          </ac:spMkLst>
+        </pc:spChg>
+        <pc:spChg chg="add del mod">
+          <ac:chgData name="공하영/연구원/오디오SW개발팀" userId="S::hayoung.gong@lge.com::54f8b2b8-100a-4714-9013-22e897ef1b2e" providerId="AD" clId="Web-{EB63EF9C-15B9-9A72-AB5A-A33A61B7A418}" dt="2025-07-09T08:12:59.417" v="135"/>
+          <ac:spMkLst>
+            <pc:docMk/>
+            <pc:sldMk cId="3287572541" sldId="261"/>
+            <ac:spMk id="68" creationId="{273DC44C-9C2C-7710-4920-8B89BD9EEED6}"/>
+          </ac:spMkLst>
+        </pc:spChg>
+        <pc:spChg chg="add mod">
+          <ac:chgData name="공하영/연구원/오디오SW개발팀" userId="S::hayoung.gong@lge.com::54f8b2b8-100a-4714-9013-22e897ef1b2e" providerId="AD" clId="Web-{EB63EF9C-15B9-9A72-AB5A-A33A61B7A418}" dt="2025-07-09T08:29:50.919" v="372" actId="20577"/>
+          <ac:spMkLst>
+            <pc:docMk/>
+            <pc:sldMk cId="3287572541" sldId="261"/>
+            <ac:spMk id="69" creationId="{F71AAE28-AF45-C246-F0E3-1C4E945B00DD}"/>
+          </ac:spMkLst>
+        </pc:spChg>
+        <pc:spChg chg="add del mod">
+          <ac:chgData name="공하영/연구원/오디오SW개발팀" userId="S::hayoung.gong@lge.com::54f8b2b8-100a-4714-9013-22e897ef1b2e" providerId="AD" clId="Web-{EB63EF9C-15B9-9A72-AB5A-A33A61B7A418}" dt="2025-07-09T08:12:57.792" v="134"/>
+          <ac:spMkLst>
+            <pc:docMk/>
+            <pc:sldMk cId="3287572541" sldId="261"/>
+            <ac:spMk id="70" creationId="{94442F45-B381-A2BB-8047-0D549F9EDDB2}"/>
+          </ac:spMkLst>
+        </pc:spChg>
+        <pc:spChg chg="mod">
+          <ac:chgData name="공하영/연구원/오디오SW개발팀" userId="S::hayoung.gong@lge.com::54f8b2b8-100a-4714-9013-22e897ef1b2e" providerId="AD" clId="Web-{EB63EF9C-15B9-9A72-AB5A-A33A61B7A418}" dt="2025-07-09T08:25:07.883" v="176" actId="20577"/>
+          <ac:spMkLst>
+            <pc:docMk/>
+            <pc:sldMk cId="3287572541" sldId="261"/>
+            <ac:spMk id="73" creationId="{4DCC1A2B-63EB-E4C4-ECFE-2828D1A70DA2}"/>
+          </ac:spMkLst>
+        </pc:spChg>
+        <pc:spChg chg="mod">
+          <ac:chgData name="공하영/연구원/오디오SW개발팀" userId="S::hayoung.gong@lge.com::54f8b2b8-100a-4714-9013-22e897ef1b2e" providerId="AD" clId="Web-{EB63EF9C-15B9-9A72-AB5A-A33A61B7A418}" dt="2025-07-09T08:24:49.867" v="167" actId="20577"/>
+          <ac:spMkLst>
+            <pc:docMk/>
+            <pc:sldMk cId="3287572541" sldId="261"/>
+            <ac:spMk id="74" creationId="{B694B6A9-0640-6A8B-2584-F042C10833DE}"/>
+          </ac:spMkLst>
+        </pc:spChg>
+        <pc:spChg chg="mod">
+          <ac:chgData name="공하영/연구원/오디오SW개발팀" userId="S::hayoung.gong@lge.com::54f8b2b8-100a-4714-9013-22e897ef1b2e" providerId="AD" clId="Web-{EB63EF9C-15B9-9A72-AB5A-A33A61B7A418}" dt="2025-07-09T08:24:33.679" v="159" actId="20577"/>
+          <ac:spMkLst>
+            <pc:docMk/>
+            <pc:sldMk cId="3287572541" sldId="261"/>
+            <ac:spMk id="75" creationId="{3C7186DF-EF59-9A20-9223-42F63F9DF243}"/>
+          </ac:spMkLst>
+        </pc:spChg>
+        <pc:spChg chg="mod">
+          <ac:chgData name="공하영/연구원/오디오SW개발팀" userId="S::hayoung.gong@lge.com::54f8b2b8-100a-4714-9013-22e897ef1b2e" providerId="AD" clId="Web-{EB63EF9C-15B9-9A72-AB5A-A33A61B7A418}" dt="2025-07-09T08:27:24.963" v="321" actId="14100"/>
+          <ac:spMkLst>
+            <pc:docMk/>
+            <pc:sldMk cId="3287572541" sldId="261"/>
+            <ac:spMk id="76" creationId="{D9AA30A5-0AD5-1D35-6991-C932EF93CB9C}"/>
+          </ac:spMkLst>
+        </pc:spChg>
+        <pc:grpChg chg="add del">
+          <ac:chgData name="공하영/연구원/오디오SW개발팀" userId="S::hayoung.gong@lge.com::54f8b2b8-100a-4714-9013-22e897ef1b2e" providerId="AD" clId="Web-{EB63EF9C-15B9-9A72-AB5A-A33A61B7A418}" dt="2025-07-09T08:09:10.835" v="7"/>
+          <ac:grpSpMkLst>
+            <pc:docMk/>
+            <pc:sldMk cId="3287572541" sldId="261"/>
+            <ac:grpSpMk id="9" creationId="{48645966-41FC-B4B4-32C7-9ED5CF7564BF}"/>
+          </ac:grpSpMkLst>
+        </pc:grpChg>
+        <pc:grpChg chg="del">
+          <ac:chgData name="공하영/연구원/오디오SW개발팀" userId="S::hayoung.gong@lge.com::54f8b2b8-100a-4714-9013-22e897ef1b2e" providerId="AD" clId="Web-{EB63EF9C-15B9-9A72-AB5A-A33A61B7A418}" dt="2025-07-09T08:09:15.835" v="10"/>
+          <ac:grpSpMkLst>
+            <pc:docMk/>
+            <pc:sldMk cId="3287572541" sldId="261"/>
+            <ac:grpSpMk id="11" creationId="{77D780A4-34F1-C33A-D47B-29A94C9A77E7}"/>
+          </ac:grpSpMkLst>
+        </pc:grpChg>
+        <pc:picChg chg="mod">
+          <ac:chgData name="공하영/연구원/오디오SW개발팀" userId="S::hayoung.gong@lge.com::54f8b2b8-100a-4714-9013-22e897ef1b2e" providerId="AD" clId="Web-{EB63EF9C-15B9-9A72-AB5A-A33A61B7A418}" dt="2025-07-09T08:34:51.002" v="374" actId="14100"/>
+          <ac:picMkLst>
+            <pc:docMk/>
+            <pc:sldMk cId="3287572541" sldId="261"/>
+            <ac:picMk id="72" creationId="{5800B87A-D3DC-28FE-0BD4-743CB8EFD7B5}"/>
+          </ac:picMkLst>
+        </pc:picChg>
+      </pc:sldChg>
+    </pc:docChg>
+  </pc:docChgLst>
+  <pc:docChgLst>
+    <pc:chgData name="안설령/연구원/Performance&amp;Stability Unit" userId="S::seolryeong.an@lge.com::26601665-48ad-49f3-832f-aea70d1d04d5" providerId="AD" clId="Web-{E98EBA03-2044-EF7F-8002-85F4B932A0DB}"/>
+    <pc:docChg chg="modSld">
+      <pc:chgData name="안설령/연구원/Performance&amp;Stability Unit" userId="S::seolryeong.an@lge.com::26601665-48ad-49f3-832f-aea70d1d04d5" providerId="AD" clId="Web-{E98EBA03-2044-EF7F-8002-85F4B932A0DB}" dt="2025-07-09T07:19:57.163" v="2"/>
+      <pc:docMkLst>
+        <pc:docMk/>
+      </pc:docMkLst>
+      <pc:sldChg chg="addSp modSp">
+        <pc:chgData name="안설령/연구원/Performance&amp;Stability Unit" userId="S::seolryeong.an@lge.com::26601665-48ad-49f3-832f-aea70d1d04d5" providerId="AD" clId="Web-{E98EBA03-2044-EF7F-8002-85F4B932A0DB}" dt="2025-07-09T07:19:57.163" v="2"/>
+        <pc:sldMkLst>
+          <pc:docMk/>
+          <pc:sldMk cId="3944304009" sldId="260"/>
+        </pc:sldMkLst>
+        <pc:spChg chg="add mod">
+          <ac:chgData name="안설령/연구원/Performance&amp;Stability Unit" userId="S::seolryeong.an@lge.com::26601665-48ad-49f3-832f-aea70d1d04d5" providerId="AD" clId="Web-{E98EBA03-2044-EF7F-8002-85F4B932A0DB}" dt="2025-07-09T07:19:57.163" v="2"/>
+          <ac:spMkLst>
+            <pc:docMk/>
+            <pc:sldMk cId="3944304009" sldId="260"/>
+            <ac:spMk id="3" creationId="{3C39C94F-6678-3340-D2C1-6DDBC2622F92}"/>
+          </ac:spMkLst>
+        </pc:spChg>
+      </pc:sldChg>
+    </pc:docChg>
+  </pc:docChgLst>
+  <pc:docChgLst>
+    <pc:chgData name="안설령/연구원/Performance&amp;Stability Unit" userId="S::seolryeong.an@lge.com::26601665-48ad-49f3-832f-aea70d1d04d5" providerId="AD" clId="Web-{88445633-C835-1670-4675-BE561F5021A9}"/>
+    <pc:docChg chg="modSld">
+      <pc:chgData name="안설령/연구원/Performance&amp;Stability Unit" userId="S::seolryeong.an@lge.com::26601665-48ad-49f3-832f-aea70d1d04d5" providerId="AD" clId="Web-{88445633-C835-1670-4675-BE561F5021A9}" dt="2025-07-09T08:42:35.972" v="325" actId="20577"/>
+      <pc:docMkLst>
+        <pc:docMk/>
+      </pc:docMkLst>
+      <pc:sldChg chg="addSp delSp modSp">
+        <pc:chgData name="안설령/연구원/Performance&amp;Stability Unit" userId="S::seolryeong.an@lge.com::26601665-48ad-49f3-832f-aea70d1d04d5" providerId="AD" clId="Web-{88445633-C835-1670-4675-BE561F5021A9}" dt="2025-07-09T08:42:35.972" v="325" actId="20577"/>
+        <pc:sldMkLst>
+          <pc:docMk/>
+          <pc:sldMk cId="3944304009" sldId="260"/>
+        </pc:sldMkLst>
+        <pc:spChg chg="mod">
+          <ac:chgData name="안설령/연구원/Performance&amp;Stability Unit" userId="S::seolryeong.an@lge.com::26601665-48ad-49f3-832f-aea70d1d04d5" providerId="AD" clId="Web-{88445633-C835-1670-4675-BE561F5021A9}" dt="2025-07-09T08:39:05.074" v="154" actId="1076"/>
+          <ac:spMkLst>
+            <pc:docMk/>
+            <pc:sldMk cId="3944304009" sldId="260"/>
+            <ac:spMk id="3" creationId="{51530E27-3660-588B-A265-EBE8003417EB}"/>
+          </ac:spMkLst>
+        </pc:spChg>
+        <pc:spChg chg="add del mod">
+          <ac:chgData name="안설령/연구원/Performance&amp;Stability Unit" userId="S::seolryeong.an@lge.com::26601665-48ad-49f3-832f-aea70d1d04d5" providerId="AD" clId="Web-{88445633-C835-1670-4675-BE561F5021A9}" dt="2025-07-09T08:41:20.251" v="263"/>
+          <ac:spMkLst>
+            <pc:docMk/>
+            <pc:sldMk cId="3944304009" sldId="260"/>
+            <ac:spMk id="6" creationId="{06262B56-923F-8AB6-7046-90697A7E7E30}"/>
+          </ac:spMkLst>
+        </pc:spChg>
+        <pc:spChg chg="mod">
+          <ac:chgData name="안설령/연구원/Performance&amp;Stability Unit" userId="S::seolryeong.an@lge.com::26601665-48ad-49f3-832f-aea70d1d04d5" providerId="AD" clId="Web-{88445633-C835-1670-4675-BE561F5021A9}" dt="2025-07-09T08:38:56.152" v="153" actId="14100"/>
+          <ac:spMkLst>
+            <pc:docMk/>
+            <pc:sldMk cId="3944304009" sldId="260"/>
+            <ac:spMk id="37" creationId="{AD4348E1-D84A-EE5D-EFBB-DA5B0918E772}"/>
+          </ac:spMkLst>
+        </pc:spChg>
+        <pc:spChg chg="mod">
+          <ac:chgData name="안설령/연구원/Performance&amp;Stability Unit" userId="S::seolryeong.an@lge.com::26601665-48ad-49f3-832f-aea70d1d04d5" providerId="AD" clId="Web-{88445633-C835-1670-4675-BE561F5021A9}" dt="2025-07-09T08:22:48.039" v="20" actId="20577"/>
+          <ac:spMkLst>
+            <pc:docMk/>
+            <pc:sldMk cId="3944304009" sldId="260"/>
+            <ac:spMk id="40" creationId="{8AAFF94B-2699-E7CC-F651-00E34366A5F5}"/>
+          </ac:spMkLst>
+        </pc:spChg>
+        <pc:spChg chg="mod">
+          <ac:chgData name="안설령/연구원/Performance&amp;Stability Unit" userId="S::seolryeong.an@lge.com::26601665-48ad-49f3-832f-aea70d1d04d5" providerId="AD" clId="Web-{88445633-C835-1670-4675-BE561F5021A9}" dt="2025-07-09T08:39:09.184" v="155" actId="14100"/>
+          <ac:spMkLst>
+            <pc:docMk/>
+            <pc:sldMk cId="3944304009" sldId="260"/>
+            <ac:spMk id="44" creationId="{5ED2BCE5-D497-8DFC-8E77-ADFE0F2BAEDC}"/>
+          </ac:spMkLst>
+        </pc:spChg>
+        <pc:spChg chg="mod">
+          <ac:chgData name="안설령/연구원/Performance&amp;Stability Unit" userId="S::seolryeong.an@lge.com::26601665-48ad-49f3-832f-aea70d1d04d5" providerId="AD" clId="Web-{88445633-C835-1670-4675-BE561F5021A9}" dt="2025-07-09T08:42:23.878" v="318" actId="1076"/>
+          <ac:spMkLst>
+            <pc:docMk/>
+            <pc:sldMk cId="3944304009" sldId="260"/>
+            <ac:spMk id="56" creationId="{8BF72CD8-CC15-8182-4723-4E68A8189E76}"/>
+          </ac:spMkLst>
+        </pc:spChg>
+        <pc:spChg chg="mod">
+          <ac:chgData name="안설령/연구원/Performance&amp;Stability Unit" userId="S::seolryeong.an@lge.com::26601665-48ad-49f3-832f-aea70d1d04d5" providerId="AD" clId="Web-{88445633-C835-1670-4675-BE561F5021A9}" dt="2025-07-09T08:42:35.972" v="325" actId="20577"/>
+          <ac:spMkLst>
+            <pc:docMk/>
+            <pc:sldMk cId="3944304009" sldId="260"/>
+            <ac:spMk id="57" creationId="{7657BBBE-B4B1-0E41-FC87-2EB3B66E467E}"/>
+          </ac:spMkLst>
+        </pc:spChg>
+        <pc:picChg chg="mod modCrop">
+          <ac:chgData name="안설령/연구원/Performance&amp;Stability Unit" userId="S::seolryeong.an@lge.com::26601665-48ad-49f3-832f-aea70d1d04d5" providerId="AD" clId="Web-{88445633-C835-1670-4675-BE561F5021A9}" dt="2025-07-09T08:20:27.643" v="1"/>
+          <ac:picMkLst>
+            <pc:docMk/>
+            <pc:sldMk cId="3944304009" sldId="260"/>
+            <ac:picMk id="4" creationId="{3C18219B-6F60-6F61-0DF2-F2BF224DE84E}"/>
+          </ac:picMkLst>
+        </pc:picChg>
+        <pc:picChg chg="mod modCrop">
+          <ac:chgData name="안설령/연구원/Performance&amp;Stability Unit" userId="S::seolryeong.an@lge.com::26601665-48ad-49f3-832f-aea70d1d04d5" providerId="AD" clId="Web-{88445633-C835-1670-4675-BE561F5021A9}" dt="2025-07-09T08:22:19.413" v="18" actId="1076"/>
+          <ac:picMkLst>
+            <pc:docMk/>
+            <pc:sldMk cId="3944304009" sldId="260"/>
+            <ac:picMk id="5" creationId="{BDB5A6F7-679E-D9CA-C87A-F546EF257FA6}"/>
+          </ac:picMkLst>
+        </pc:picChg>
+        <pc:picChg chg="mod modCrop">
+          <ac:chgData name="안설령/연구원/Performance&amp;Stability Unit" userId="S::seolryeong.an@lge.com::26601665-48ad-49f3-832f-aea70d1d04d5" providerId="AD" clId="Web-{88445633-C835-1670-4675-BE561F5021A9}" dt="2025-07-09T08:38:50.620" v="152" actId="1076"/>
+          <ac:picMkLst>
+            <pc:docMk/>
+            <pc:sldMk cId="3944304009" sldId="260"/>
+            <ac:picMk id="38" creationId="{B3BF3DE6-5942-3393-2A3A-8C66D736F41D}"/>
+          </ac:picMkLst>
+        </pc:picChg>
+      </pc:sldChg>
+      <pc:sldChg chg="modSp">
+        <pc:chgData name="안설령/연구원/Performance&amp;Stability Unit" userId="S::seolryeong.an@lge.com::26601665-48ad-49f3-832f-aea70d1d04d5" providerId="AD" clId="Web-{88445633-C835-1670-4675-BE561F5021A9}" dt="2025-07-09T08:36:40.647" v="146" actId="1076"/>
+        <pc:sldMkLst>
+          <pc:docMk/>
+          <pc:sldMk cId="3287572541" sldId="261"/>
+        </pc:sldMkLst>
+        <pc:spChg chg="mod ord">
+          <ac:chgData name="안설령/연구원/Performance&amp;Stability Unit" userId="S::seolryeong.an@lge.com::26601665-48ad-49f3-832f-aea70d1d04d5" providerId="AD" clId="Web-{88445633-C835-1670-4675-BE561F5021A9}" dt="2025-07-09T08:34:09.751" v="119" actId="1076"/>
+          <ac:spMkLst>
+            <pc:docMk/>
+            <pc:sldMk cId="3287572541" sldId="261"/>
+            <ac:spMk id="69" creationId="{F71AAE28-AF45-C246-F0E3-1C4E945B00DD}"/>
+          </ac:spMkLst>
+        </pc:spChg>
+        <pc:spChg chg="mod">
+          <ac:chgData name="안설령/연구원/Performance&amp;Stability Unit" userId="S::seolryeong.an@lge.com::26601665-48ad-49f3-832f-aea70d1d04d5" providerId="AD" clId="Web-{88445633-C835-1670-4675-BE561F5021A9}" dt="2025-07-09T08:24:31.605" v="27" actId="20577"/>
+          <ac:spMkLst>
+            <pc:docMk/>
+            <pc:sldMk cId="3287572541" sldId="261"/>
+            <ac:spMk id="73" creationId="{4DCC1A2B-63EB-E4C4-ECFE-2828D1A70DA2}"/>
+          </ac:spMkLst>
+        </pc:spChg>
+        <pc:spChg chg="mod">
+          <ac:chgData name="안설령/연구원/Performance&amp;Stability Unit" userId="S::seolryeong.an@lge.com::26601665-48ad-49f3-832f-aea70d1d04d5" providerId="AD" clId="Web-{88445633-C835-1670-4675-BE561F5021A9}" dt="2025-07-09T08:34:17.861" v="120" actId="1076"/>
+          <ac:spMkLst>
+            <pc:docMk/>
+            <pc:sldMk cId="3287572541" sldId="261"/>
+            <ac:spMk id="75" creationId="{3C7186DF-EF59-9A20-9223-42F63F9DF243}"/>
+          </ac:spMkLst>
+        </pc:spChg>
+        <pc:spChg chg="mod">
+          <ac:chgData name="안설령/연구원/Performance&amp;Stability Unit" userId="S::seolryeong.an@lge.com::26601665-48ad-49f3-832f-aea70d1d04d5" providerId="AD" clId="Web-{88445633-C835-1670-4675-BE561F5021A9}" dt="2025-07-09T08:34:23.705" v="121" actId="1076"/>
+          <ac:spMkLst>
+            <pc:docMk/>
+            <pc:sldMk cId="3287572541" sldId="261"/>
+            <ac:spMk id="76" creationId="{D9AA30A5-0AD5-1D35-6991-C932EF93CB9C}"/>
+          </ac:spMkLst>
+        </pc:spChg>
+        <pc:picChg chg="mod modCrop">
+          <ac:chgData name="안설령/연구원/Performance&amp;Stability Unit" userId="S::seolryeong.an@lge.com::26601665-48ad-49f3-832f-aea70d1d04d5" providerId="AD" clId="Web-{88445633-C835-1670-4675-BE561F5021A9}" dt="2025-07-09T08:36:31.912" v="144" actId="1076"/>
+          <ac:picMkLst>
+            <pc:docMk/>
+            <pc:sldMk cId="3287572541" sldId="261"/>
+            <ac:picMk id="67" creationId="{594A9D24-19E7-38BE-7969-5D2EAB3A8372}"/>
+          </ac:picMkLst>
+        </pc:picChg>
+        <pc:picChg chg="mod modCrop">
+          <ac:chgData name="안설령/연구원/Performance&amp;Stability Unit" userId="S::seolryeong.an@lge.com::26601665-48ad-49f3-832f-aea70d1d04d5" providerId="AD" clId="Web-{88445633-C835-1670-4675-BE561F5021A9}" dt="2025-07-09T08:36:40.647" v="146" actId="1076"/>
+          <ac:picMkLst>
+            <pc:docMk/>
+            <pc:sldMk cId="3287572541" sldId="261"/>
+            <ac:picMk id="71" creationId="{EC11D9A4-49FC-327F-6A44-6105451A3869}"/>
+          </ac:picMkLst>
+        </pc:picChg>
+        <pc:picChg chg="mod">
+          <ac:chgData name="안설령/연구원/Performance&amp;Stability Unit" userId="S::seolryeong.an@lge.com::26601665-48ad-49f3-832f-aea70d1d04d5" providerId="AD" clId="Web-{88445633-C835-1670-4675-BE561F5021A9}" dt="2025-07-09T08:35:42.301" v="136" actId="1076"/>
+          <ac:picMkLst>
+            <pc:docMk/>
+            <pc:sldMk cId="3287572541" sldId="261"/>
+            <ac:picMk id="72" creationId="{5800B87A-D3DC-28FE-0BD4-743CB8EFD7B5}"/>
+          </ac:picMkLst>
+        </pc:picChg>
+      </pc:sldChg>
+    </pc:docChg>
+  </pc:docChgLst>
+  <pc:docChgLst>
+    <pc:chgData name="이윤성/연구원/리빙솔루션SW플랫폼개발Project" userId="S::yunsung.lee@lge.com::d789b5fd-4eef-4e5f-b3ed-842c58fa3295" providerId="AD" clId="Web-{8FF3D557-A3D5-B4DF-7CEF-DB3020CE293F}"/>
+    <pc:docChg chg="modSld">
+      <pc:chgData name="이윤성/연구원/리빙솔루션SW플랫폼개발Project" userId="S::yunsung.lee@lge.com::d789b5fd-4eef-4e5f-b3ed-842c58fa3295" providerId="AD" clId="Web-{8FF3D557-A3D5-B4DF-7CEF-DB3020CE293F}" dt="2025-07-09T08:20:41.131" v="14"/>
+      <pc:docMkLst>
+        <pc:docMk/>
+      </pc:docMkLst>
+      <pc:sldChg chg="modSp">
+        <pc:chgData name="이윤성/연구원/리빙솔루션SW플랫폼개발Project" userId="S::yunsung.lee@lge.com::d789b5fd-4eef-4e5f-b3ed-842c58fa3295" providerId="AD" clId="Web-{8FF3D557-A3D5-B4DF-7CEF-DB3020CE293F}" dt="2025-07-09T08:20:41.131" v="14"/>
+        <pc:sldMkLst>
+          <pc:docMk/>
+          <pc:sldMk cId="3287572541" sldId="261"/>
+        </pc:sldMkLst>
+        <pc:spChg chg="mod">
+          <ac:chgData name="이윤성/연구원/리빙솔루션SW플랫폼개발Project" userId="S::yunsung.lee@lge.com::d789b5fd-4eef-4e5f-b3ed-842c58fa3295" providerId="AD" clId="Web-{8FF3D557-A3D5-B4DF-7CEF-DB3020CE293F}" dt="2025-07-09T08:19:54.160" v="10" actId="20577"/>
+          <ac:spMkLst>
+            <pc:docMk/>
+            <pc:sldMk cId="3287572541" sldId="261"/>
+            <ac:spMk id="40" creationId="{8D3A6D4F-2616-B2E7-F5C5-C3E62725CC4E}"/>
+          </ac:spMkLst>
+        </pc:spChg>
+        <pc:picChg chg="mod ord">
+          <ac:chgData name="이윤성/연구원/리빙솔루션SW플랫폼개발Project" userId="S::yunsung.lee@lge.com::d789b5fd-4eef-4e5f-b3ed-842c58fa3295" providerId="AD" clId="Web-{8FF3D557-A3D5-B4DF-7CEF-DB3020CE293F}" dt="2025-07-09T08:20:41.131" v="14"/>
+          <ac:picMkLst>
+            <pc:docMk/>
+            <pc:sldMk cId="3287572541" sldId="261"/>
+            <ac:picMk id="71" creationId="{EC11D9A4-49FC-327F-6A44-6105451A3869}"/>
+          </ac:picMkLst>
+        </pc:picChg>
+      </pc:sldChg>
+    </pc:docChg>
+  </pc:docChgLst>
+</pc:chgInfo>
 </file>
 
 <file path=ppt/notesMasters/notesMaster1.xml><?xml version="1.0" encoding="utf-8"?>
@@ -350,6 +1939,7 @@
   <p:clrMapOvr>
     <a:masterClrMapping/>
   </p:clrMapOvr>
+  <p:hf sldNum="0" hdr="0" dt="0"/>
 </p:sldLayout>
 </file>
 
@@ -650,7 +2240,7 @@
   <p:sldLayoutIdLst>
     <p:sldLayoutId id="2147483675" r:id="rId1"/>
   </p:sldLayoutIdLst>
-  <p:hf sldNum="0" hdr="0" ftr="0" dt="0"/>
+  <p:hf sldNum="0" hdr="0" dt="0"/>
   <p:txStyles>
     <p:titleStyle>
       <a:lvl1pPr algn="l" defTabSz="685800" rtl="0" eaLnBrk="1" latinLnBrk="1" hangingPunct="1">
@@ -988,10 +2578,15 @@
                 <a:solidFill>
                   <a:schemeClr val="bg1"/>
                 </a:solidFill>
+                <a:ea typeface="맑은 고딕"/>
               </a:rPr>
               <a:t>Sound Maker</a:t>
             </a:r>
-            <a:endParaRPr lang="en-US" altLang="ko-KR"/>
+            <a:endParaRPr lang="en-US" altLang="ko-KR">
+              <a:solidFill>
+                <a:schemeClr val="bg1"/>
+              </a:solidFill>
+            </a:endParaRPr>
           </a:p>
         </p:txBody>
       </p:sp>
@@ -1635,7 +3230,7 @@
         <p:spPr>
           <a:xfrm>
             <a:off x="3507950" y="5871461"/>
-            <a:ext cx="3110389" cy="523220"/>
+            <a:ext cx="3110389" cy="738664"/>
           </a:xfrm>
           <a:prstGeom prst="rect">
             <a:avLst/>
@@ -1791,10 +3386,10 @@
       </p:pic>
       <p:pic>
         <p:nvPicPr>
-          <p:cNvPr id="5" name="Picture 4">
+          <p:cNvPr id="6" name="Picture 5" descr="A diagram of a graph&#10;&#10;AI-generated content may be incorrect.">
             <a:extLst>
               <a:ext uri="{FF2B5EF4-FFF2-40B4-BE49-F238E27FC236}">
-                <a16:creationId xmlns:a16="http://schemas.microsoft.com/office/drawing/2014/main" id="{BDB5A6F7-679E-D9CA-C87A-F546EF257FA6}"/>
+                <a16:creationId xmlns:a16="http://schemas.microsoft.com/office/drawing/2014/main" id="{7835AA02-9641-4B9B-85F1-6657E59F606D}"/>
               </a:ext>
             </a:extLst>
           </p:cNvPr>
@@ -1805,15 +3400,14 @@
         </p:nvPicPr>
         <p:blipFill>
           <a:blip r:embed="rId4"/>
-          <a:srcRect l="3311" r="1325" b="-441"/>
           <a:stretch>
             <a:fillRect/>
           </a:stretch>
         </p:blipFill>
         <p:spPr>
           <a:xfrm>
-            <a:off x="3506085" y="6739881"/>
-            <a:ext cx="3082014" cy="2432515"/>
+            <a:off x="3484260" y="6724685"/>
+            <a:ext cx="3144825" cy="2192026"/>
           </a:xfrm>
           <a:prstGeom prst="rect">
             <a:avLst/>
@@ -1823,6 +3417,54 @@
           </a:ln>
         </p:spPr>
       </p:pic>
+      <p:sp>
+        <p:nvSpPr>
+          <p:cNvPr id="7" name="TextBox 6">
+            <a:extLst>
+              <a:ext uri="{FF2B5EF4-FFF2-40B4-BE49-F238E27FC236}">
+                <a16:creationId xmlns:a16="http://schemas.microsoft.com/office/drawing/2014/main" id="{95184400-A0E2-BDC9-3FCC-4D7002C53F35}"/>
+              </a:ext>
+            </a:extLst>
+          </p:cNvPr>
+          <p:cNvSpPr txBox="1"/>
+          <p:nvPr/>
+        </p:nvSpPr>
+        <p:spPr>
+          <a:xfrm>
+            <a:off x="6308558" y="9550400"/>
+            <a:ext cx="550779" cy="349904"/>
+          </a:xfrm>
+          <a:prstGeom prst="rect">
+            <a:avLst/>
+          </a:prstGeom>
+          <a:noFill/>
+        </p:spPr>
+        <p:txBody>
+          <a:bodyPr rot="0" spcFirstLastPara="0" vertOverflow="overflow" horzOverflow="overflow" vert="horz" wrap="square" lIns="91440" tIns="45720" rIns="91440" bIns="45720" numCol="1" spcCol="0" rtlCol="0" fromWordArt="0" anchor="t" anchorCtr="0" forceAA="0" compatLnSpc="1">
+            <a:prstTxWarp prst="textNoShape">
+              <a:avLst/>
+            </a:prstTxWarp>
+            <a:spAutoFit/>
+          </a:bodyPr>
+          <a:lstStyle/>
+          <a:p>
+            <a:pPr algn="r">
+              <a:lnSpc>
+                <a:spcPts val="2175"/>
+              </a:lnSpc>
+            </a:pPr>
+            <a:r>
+              <a:rPr lang="ko-KR" altLang="en-US" sz="1400">
+                <a:latin typeface="Arial"/>
+                <a:ea typeface="LG Smart_H2.0 R"/>
+                <a:cs typeface="Arial"/>
+              </a:rPr>
+              <a:t>1/2</a:t>
+            </a:r>
+            <a:endParaRPr lang="en-US" altLang="ko-KR"/>
+          </a:p>
+        </p:txBody>
+      </p:sp>
     </p:spTree>
     <p:extLst>
       <p:ext uri="{BB962C8B-B14F-4D97-AF65-F5344CB8AC3E}">
@@ -1854,7 +3496,7 @@
         <p:cNvPr id="1" name="">
           <a:extLst>
             <a:ext uri="{FF2B5EF4-FFF2-40B4-BE49-F238E27FC236}">
-              <a16:creationId xmlns:a16="http://schemas.microsoft.com/office/drawing/2014/main" id="{4C824FC8-5CBC-C605-FDCA-D75E1F9BA0B3}"/>
+              <a16:creationId xmlns:a16="http://schemas.microsoft.com/office/drawing/2014/main" id="{4698856E-5BC9-4DDF-956D-FEEDCCF6CD26}"/>
             </a:ext>
           </a:extLst>
         </p:cNvPr>
@@ -1874,7 +3516,7 @@
           <p:cNvPr id="2" name="TextBox 1">
             <a:extLst>
               <a:ext uri="{FF2B5EF4-FFF2-40B4-BE49-F238E27FC236}">
-                <a16:creationId xmlns:a16="http://schemas.microsoft.com/office/drawing/2014/main" id="{98EE678B-10F3-D033-5B0C-8434AD377673}"/>
+                <a16:creationId xmlns:a16="http://schemas.microsoft.com/office/drawing/2014/main" id="{170CB1CC-E3BE-F4B0-53E0-4E8C1B0FB7C3}"/>
               </a:ext>
             </a:extLst>
           </p:cNvPr>
@@ -1914,7 +3556,7 @@
           <p:cNvPr id="37" name="Rectangle: Rounded Corners 36">
             <a:extLst>
               <a:ext uri="{FF2B5EF4-FFF2-40B4-BE49-F238E27FC236}">
-                <a16:creationId xmlns:a16="http://schemas.microsoft.com/office/drawing/2014/main" id="{8E33F961-C3CA-8FF2-04BB-00CDCD23AE20}"/>
+                <a16:creationId xmlns:a16="http://schemas.microsoft.com/office/drawing/2014/main" id="{AC41C52E-A6C2-26AD-90DA-6F6A8C4BDACE}"/>
               </a:ext>
             </a:extLst>
           </p:cNvPr>
@@ -1976,7 +3618,7 @@
           <p:cNvPr id="40" name="Rectangle: Rounded Corners 39">
             <a:extLst>
               <a:ext uri="{FF2B5EF4-FFF2-40B4-BE49-F238E27FC236}">
-                <a16:creationId xmlns:a16="http://schemas.microsoft.com/office/drawing/2014/main" id="{8D3A6D4F-2616-B2E7-F5C5-C3E62725CC4E}"/>
+                <a16:creationId xmlns:a16="http://schemas.microsoft.com/office/drawing/2014/main" id="{8F250601-D433-303E-9CD9-F9C95441665F}"/>
               </a:ext>
             </a:extLst>
           </p:cNvPr>
@@ -2041,7 +3683,7 @@
           <p:cNvPr id="42" name="TextBox 41">
             <a:extLst>
               <a:ext uri="{FF2B5EF4-FFF2-40B4-BE49-F238E27FC236}">
-                <a16:creationId xmlns:a16="http://schemas.microsoft.com/office/drawing/2014/main" id="{1D321675-5832-DE60-1AE6-B18CF509E8B5}"/>
+                <a16:creationId xmlns:a16="http://schemas.microsoft.com/office/drawing/2014/main" id="{9280D9A7-609B-B90B-B43B-2F5836613F70}"/>
               </a:ext>
             </a:extLst>
           </p:cNvPr>
@@ -2241,7 +3883,7 @@
           <p:cNvPr id="3" name="Rectangle: Rounded Corners 2">
             <a:extLst>
               <a:ext uri="{FF2B5EF4-FFF2-40B4-BE49-F238E27FC236}">
-                <a16:creationId xmlns:a16="http://schemas.microsoft.com/office/drawing/2014/main" id="{90826EC9-E3C4-B06F-D65B-2465FAB7A3C3}"/>
+                <a16:creationId xmlns:a16="http://schemas.microsoft.com/office/drawing/2014/main" id="{412C0A92-7F20-2B99-DCE8-A2C06D8C396A}"/>
               </a:ext>
             </a:extLst>
           </p:cNvPr>
@@ -2250,8 +3892,8 @@
         </p:nvSpPr>
         <p:spPr>
           <a:xfrm>
-            <a:off x="236664" y="5694207"/>
-            <a:ext cx="6404040" cy="4003839"/>
+            <a:off x="236664" y="6399762"/>
+            <a:ext cx="6418151" cy="3298284"/>
           </a:xfrm>
           <a:prstGeom prst="roundRect">
             <a:avLst/>
@@ -2303,7 +3945,7 @@
           <p:cNvPr id="5" name="Rectangle: Rounded Corners 4">
             <a:extLst>
               <a:ext uri="{FF2B5EF4-FFF2-40B4-BE49-F238E27FC236}">
-                <a16:creationId xmlns:a16="http://schemas.microsoft.com/office/drawing/2014/main" id="{4935A44E-BA97-21C6-321F-2FC4B846D390}"/>
+                <a16:creationId xmlns:a16="http://schemas.microsoft.com/office/drawing/2014/main" id="{05632D81-B1C7-BF08-10EA-FBB409B995BE}"/>
               </a:ext>
             </a:extLst>
           </p:cNvPr>
@@ -2312,8 +3954,8 @@
         </p:nvSpPr>
         <p:spPr>
           <a:xfrm>
-            <a:off x="236535" y="3475263"/>
-            <a:ext cx="6404040" cy="1916975"/>
+            <a:off x="236535" y="3503485"/>
+            <a:ext cx="6418151" cy="2573141"/>
           </a:xfrm>
           <a:prstGeom prst="roundRect">
             <a:avLst/>
@@ -2360,113 +4002,12 @@
           </a:p>
         </p:txBody>
       </p:sp>
-      <p:pic>
-        <p:nvPicPr>
-          <p:cNvPr id="71" name="Picture 70">
-            <a:extLst>
-              <a:ext uri="{FF2B5EF4-FFF2-40B4-BE49-F238E27FC236}">
-                <a16:creationId xmlns:a16="http://schemas.microsoft.com/office/drawing/2014/main" id="{EC11D9A4-49FC-327F-6A44-6105451A3869}"/>
-              </a:ext>
-            </a:extLst>
-          </p:cNvPr>
-          <p:cNvPicPr>
-            <a:picLocks noChangeAspect="1"/>
-          </p:cNvPicPr>
-          <p:nvPr/>
-        </p:nvPicPr>
-        <p:blipFill>
-          <a:blip r:embed="rId2"/>
-          <a:srcRect r="-715" b="2752"/>
-          <a:stretch>
-            <a:fillRect/>
-          </a:stretch>
-        </p:blipFill>
-        <p:spPr>
-          <a:xfrm>
-            <a:off x="599425" y="3930337"/>
-            <a:ext cx="5934979" cy="1403285"/>
-          </a:xfrm>
-          <a:prstGeom prst="rect">
-            <a:avLst/>
-          </a:prstGeom>
-          <a:ln>
-            <a:noFill/>
-          </a:ln>
-        </p:spPr>
-      </p:pic>
-      <p:pic>
-        <p:nvPicPr>
-          <p:cNvPr id="67" name="Picture 66">
-            <a:extLst>
-              <a:ext uri="{FF2B5EF4-FFF2-40B4-BE49-F238E27FC236}">
-                <a16:creationId xmlns:a16="http://schemas.microsoft.com/office/drawing/2014/main" id="{594A9D24-19E7-38BE-7969-5D2EAB3A8372}"/>
-              </a:ext>
-            </a:extLst>
-          </p:cNvPr>
-          <p:cNvPicPr>
-            <a:picLocks noChangeAspect="1"/>
-          </p:cNvPicPr>
-          <p:nvPr/>
-        </p:nvPicPr>
-        <p:blipFill>
-          <a:blip r:embed="rId3"/>
-          <a:srcRect l="55" t="1083" r="7" b="4678"/>
-          <a:stretch>
-            <a:fillRect/>
-          </a:stretch>
-        </p:blipFill>
-        <p:spPr>
-          <a:xfrm>
-            <a:off x="396420" y="1833097"/>
-            <a:ext cx="6139807" cy="1301471"/>
-          </a:xfrm>
-          <a:prstGeom prst="rect">
-            <a:avLst/>
-          </a:prstGeom>
-          <a:ln>
-            <a:noFill/>
-          </a:ln>
-        </p:spPr>
-      </p:pic>
-      <p:pic>
-        <p:nvPicPr>
-          <p:cNvPr id="72" name="Picture 71">
-            <a:extLst>
-              <a:ext uri="{FF2B5EF4-FFF2-40B4-BE49-F238E27FC236}">
-                <a16:creationId xmlns:a16="http://schemas.microsoft.com/office/drawing/2014/main" id="{5800B87A-D3DC-28FE-0BD4-743CB8EFD7B5}"/>
-              </a:ext>
-            </a:extLst>
-          </p:cNvPr>
-          <p:cNvPicPr>
-            <a:picLocks noChangeAspect="1"/>
-          </p:cNvPicPr>
-          <p:nvPr/>
-        </p:nvPicPr>
-        <p:blipFill>
-          <a:blip r:embed="rId4"/>
-          <a:stretch>
-            <a:fillRect/>
-          </a:stretch>
-        </p:blipFill>
-        <p:spPr>
-          <a:xfrm>
-            <a:off x="710876" y="6507939"/>
-            <a:ext cx="5520470" cy="3063927"/>
-          </a:xfrm>
-          <a:prstGeom prst="rect">
-            <a:avLst/>
-          </a:prstGeom>
-          <a:ln>
-            <a:noFill/>
-          </a:ln>
-        </p:spPr>
-      </p:pic>
       <p:sp>
         <p:nvSpPr>
           <p:cNvPr id="73" name="Rectangle: Rounded Corners 72">
             <a:extLst>
               <a:ext uri="{FF2B5EF4-FFF2-40B4-BE49-F238E27FC236}">
-                <a16:creationId xmlns:a16="http://schemas.microsoft.com/office/drawing/2014/main" id="{4DCC1A2B-63EB-E4C4-ECFE-2828D1A70DA2}"/>
+                <a16:creationId xmlns:a16="http://schemas.microsoft.com/office/drawing/2014/main" id="{6EE814E5-DF4A-0972-6D42-979C13FDF979}"/>
               </a:ext>
             </a:extLst>
           </p:cNvPr>
@@ -2547,7 +4088,7 @@
           <p:cNvPr id="74" name="Rectangle: Rounded Corners 73">
             <a:extLst>
               <a:ext uri="{FF2B5EF4-FFF2-40B4-BE49-F238E27FC236}">
-                <a16:creationId xmlns:a16="http://schemas.microsoft.com/office/drawing/2014/main" id="{B694B6A9-0640-6A8B-2584-F042C10833DE}"/>
+                <a16:creationId xmlns:a16="http://schemas.microsoft.com/office/drawing/2014/main" id="{6761F9B3-9F31-7A64-224B-5CCC7A928F98}"/>
               </a:ext>
             </a:extLst>
           </p:cNvPr>
@@ -2556,7 +4097,7 @@
         </p:nvSpPr>
         <p:spPr>
           <a:xfrm>
-            <a:off x="441869" y="5484321"/>
+            <a:off x="441869" y="6189877"/>
             <a:ext cx="1826660" cy="415393"/>
           </a:xfrm>
           <a:prstGeom prst="roundRect">
@@ -2597,38 +4138,198 @@
           <a:p>
             <a:pPr algn="ctr"/>
             <a:r>
-              <a:rPr lang="ko-KR" altLang="en-US" b="1" err="1">
+              <a:rPr lang="ko-KR" altLang="en-US" sz="1700" b="1">
                 <a:latin typeface="LG Smart_H2.0 R"/>
                 <a:ea typeface="맑은 고딕"/>
                 <a:cs typeface="Calibri"/>
               </a:rPr>
-              <a:t>Audio</a:t>
-            </a:r>
-            <a:r>
-              <a:rPr lang="ko-KR" altLang="en-US" b="1">
+              <a:t>SW </a:t>
+            </a:r>
+            <a:r>
+              <a:rPr lang="ko-KR" altLang="en-US" sz="1700" b="1" err="1">
                 <a:latin typeface="LG Smart_H2.0 R"/>
                 <a:ea typeface="맑은 고딕"/>
                 <a:cs typeface="Calibri"/>
               </a:rPr>
-              <a:t> </a:t>
-            </a:r>
-            <a:r>
-              <a:rPr lang="ko-KR" altLang="en-US" b="1" err="1">
+              <a:t>Audio</a:t>
+            </a:r>
+            <a:r>
+              <a:rPr lang="ko-KR" altLang="en-US" sz="1700" b="1">
                 <a:latin typeface="LG Smart_H2.0 R"/>
                 <a:ea typeface="맑은 고딕"/>
                 <a:cs typeface="Calibri"/>
               </a:rPr>
-              <a:t>Mixing</a:t>
-            </a:r>
+              <a:t> </a:t>
+            </a:r>
+            <a:r>
+              <a:rPr lang="ko-KR" altLang="en-US" sz="1700" b="1" err="1">
+                <a:latin typeface="LG Smart_H2.0 R"/>
+                <a:ea typeface="맑은 고딕"/>
+                <a:cs typeface="Calibri"/>
+              </a:rPr>
+              <a:t>Mixer</a:t>
+            </a:r>
+            <a:endParaRPr lang="en-US" altLang="ko-KR" sz="1700">
+              <a:ea typeface="맑은 고딕"/>
+              <a:cs typeface="Calibri"/>
+            </a:endParaRPr>
           </a:p>
         </p:txBody>
       </p:sp>
       <p:sp>
         <p:nvSpPr>
+          <p:cNvPr id="76" name="TextBox 75">
+            <a:extLst>
+              <a:ext uri="{FF2B5EF4-FFF2-40B4-BE49-F238E27FC236}">
+                <a16:creationId xmlns:a16="http://schemas.microsoft.com/office/drawing/2014/main" id="{2890174C-EAF9-5E5F-6416-27F800EA6396}"/>
+              </a:ext>
+            </a:extLst>
+          </p:cNvPr>
+          <p:cNvSpPr txBox="1"/>
+          <p:nvPr/>
+        </p:nvSpPr>
+        <p:spPr>
+          <a:xfrm>
+            <a:off x="522600" y="6694966"/>
+            <a:ext cx="5820747" cy="307777"/>
+          </a:xfrm>
+          <a:prstGeom prst="rect">
+            <a:avLst/>
+          </a:prstGeom>
+          <a:noFill/>
+        </p:spPr>
+        <p:txBody>
+          <a:bodyPr rot="0" spcFirstLastPara="0" vertOverflow="overflow" horzOverflow="overflow" vert="horz" wrap="square" lIns="91440" tIns="45720" rIns="91440" bIns="45720" numCol="1" spcCol="0" rtlCol="0" fromWordArt="0" anchor="t" anchorCtr="0" forceAA="0" compatLnSpc="1">
+            <a:prstTxWarp prst="textNoShape">
+              <a:avLst/>
+            </a:prstTxWarp>
+            <a:spAutoFit/>
+          </a:bodyPr>
+          <a:lstStyle/>
+          <a:p>
+            <a:pPr marL="285750" indent="-285750">
+              <a:buFont typeface="Wingdings"/>
+              <a:buChar char="Ø"/>
+            </a:pPr>
+            <a:r>
+              <a:rPr lang="en-US" altLang="ko-KR" sz="1400" b="1">
+                <a:latin typeface="LG Smart_H2.0 R"/>
+                <a:ea typeface="+mn-lt"/>
+                <a:cs typeface="+mn-lt"/>
+              </a:rPr>
+              <a:t>PCM</a:t>
+            </a:r>
+            <a:r>
+              <a:rPr lang="ko-KR" sz="1400" b="1">
+                <a:latin typeface="LG Smart_H2.0 R"/>
+                <a:ea typeface="LG Smart_H2.0 R"/>
+                <a:cs typeface="+mn-lt"/>
+              </a:rPr>
+              <a:t> 파일 </a:t>
+            </a:r>
+            <a:r>
+              <a:rPr lang="en-US" altLang="ko-KR" sz="1400" b="1">
+                <a:latin typeface="LG Smart_H2.0 R"/>
+                <a:ea typeface="+mn-lt"/>
+                <a:cs typeface="+mn-lt"/>
+              </a:rPr>
+              <a:t>pre-load</a:t>
+            </a:r>
+            <a:r>
+              <a:rPr lang="ko-KR" sz="1400" b="1">
+                <a:latin typeface="LG Smart_H2.0 R"/>
+                <a:ea typeface="LG Smart_H2.0 R"/>
+                <a:cs typeface="+mn-lt"/>
+              </a:rPr>
+              <a:t> 후, </a:t>
+            </a:r>
+            <a:r>
+              <a:rPr lang="en-US" altLang="ko-KR" sz="1400" b="1" err="1">
+                <a:latin typeface="LG Smart_H2.0 R"/>
+                <a:ea typeface="+mn-lt"/>
+                <a:cs typeface="+mn-lt"/>
+              </a:rPr>
+              <a:t>mixbuffer</a:t>
+            </a:r>
+            <a:r>
+              <a:rPr lang="ko-KR" sz="1400" b="1" err="1">
+                <a:latin typeface="LG Smart_H2.0 R"/>
+                <a:ea typeface="LG Smart_H2.0 R"/>
+                <a:cs typeface="+mn-lt"/>
+              </a:rPr>
+              <a:t>에</a:t>
+            </a:r>
+            <a:r>
+              <a:rPr lang="ko-KR" sz="1400" b="1">
+                <a:latin typeface="LG Smart_H2.0 R"/>
+                <a:ea typeface="LG Smart_H2.0 R"/>
+                <a:cs typeface="+mn-lt"/>
+              </a:rPr>
+              <a:t> </a:t>
+            </a:r>
+            <a:r>
+              <a:rPr lang="en-US" altLang="ko-KR" sz="1400" b="1">
+                <a:latin typeface="LG Smart_H2.0 R"/>
+                <a:ea typeface="+mn-lt"/>
+                <a:cs typeface="+mn-lt"/>
+              </a:rPr>
+              <a:t>mixing</a:t>
+            </a:r>
+            <a:r>
+              <a:rPr lang="ko-KR" sz="1400" b="1">
+                <a:latin typeface="LG Smart_H2.0 R"/>
+                <a:ea typeface="LG Smart_H2.0 R"/>
+                <a:cs typeface="+mn-lt"/>
+              </a:rPr>
+              <a:t> </a:t>
+            </a:r>
+            <a:endParaRPr lang="ko-KR" b="1">
+              <a:latin typeface="LG Smart_H2.0 R"/>
+              <a:ea typeface="LG Smart_H2.0 R"/>
+              <a:cs typeface="Calibri" panose="020F0502020204030204"/>
+            </a:endParaRPr>
+          </a:p>
+        </p:txBody>
+      </p:sp>
+      <p:pic>
+        <p:nvPicPr>
+          <p:cNvPr id="4" name="Picture 3" descr="A computer chip with music notes flying out&#10;&#10;AI-generated content may be incorrect.">
+            <a:extLst>
+              <a:ext uri="{FF2B5EF4-FFF2-40B4-BE49-F238E27FC236}">
+                <a16:creationId xmlns:a16="http://schemas.microsoft.com/office/drawing/2014/main" id="{A92CE6D3-3599-829A-F666-FD76E95D90E5}"/>
+              </a:ext>
+            </a:extLst>
+          </p:cNvPr>
+          <p:cNvPicPr>
+            <a:picLocks noChangeAspect="1"/>
+          </p:cNvPicPr>
+          <p:nvPr/>
+        </p:nvPicPr>
+        <p:blipFill>
+          <a:blip r:embed="rId2"/>
+          <a:stretch>
+            <a:fillRect/>
+          </a:stretch>
+        </p:blipFill>
+        <p:spPr>
+          <a:xfrm>
+            <a:off x="381000" y="1775426"/>
+            <a:ext cx="6117167" cy="1380980"/>
+          </a:xfrm>
+          <a:prstGeom prst="rect">
+            <a:avLst/>
+          </a:prstGeom>
+          <a:ln>
+            <a:noFill/>
+          </a:ln>
+        </p:spPr>
+      </p:pic>
+      <p:sp>
+        <p:nvSpPr>
           <p:cNvPr id="75" name="TextBox 74">
             <a:extLst>
               <a:ext uri="{FF2B5EF4-FFF2-40B4-BE49-F238E27FC236}">
-                <a16:creationId xmlns:a16="http://schemas.microsoft.com/office/drawing/2014/main" id="{3C7186DF-EF59-9A20-9223-42F63F9DF243}"/>
+                <a16:creationId xmlns:a16="http://schemas.microsoft.com/office/drawing/2014/main" id="{F87147C3-831E-6FB9-C906-EB18993597C8}"/>
               </a:ext>
             </a:extLst>
           </p:cNvPr>
@@ -2702,194 +4403,75 @@
           </a:p>
         </p:txBody>
       </p:sp>
-      <p:sp>
-        <p:nvSpPr>
-          <p:cNvPr id="76" name="TextBox 75">
+      <p:pic>
+        <p:nvPicPr>
+          <p:cNvPr id="6" name="Picture 5" descr="A diagram of a note&#10;&#10;AI-generated content may be incorrect.">
             <a:extLst>
               <a:ext uri="{FF2B5EF4-FFF2-40B4-BE49-F238E27FC236}">
-                <a16:creationId xmlns:a16="http://schemas.microsoft.com/office/drawing/2014/main" id="{D9AA30A5-0AD5-1D35-6991-C932EF93CB9C}"/>
+                <a16:creationId xmlns:a16="http://schemas.microsoft.com/office/drawing/2014/main" id="{AD0E5F62-FEB8-33C8-7997-E62667B7B34C}"/>
               </a:ext>
             </a:extLst>
           </p:cNvPr>
-          <p:cNvSpPr txBox="1"/>
+          <p:cNvPicPr>
+            <a:picLocks noChangeAspect="1"/>
+          </p:cNvPicPr>
           <p:nvPr/>
-        </p:nvSpPr>
+        </p:nvPicPr>
+        <p:blipFill>
+          <a:blip r:embed="rId3"/>
+          <a:stretch>
+            <a:fillRect/>
+          </a:stretch>
+        </p:blipFill>
         <p:spPr>
           <a:xfrm>
-            <a:off x="522600" y="5940022"/>
-            <a:ext cx="5820747" cy="533106"/>
+            <a:off x="486834" y="7065212"/>
+            <a:ext cx="5947833" cy="2485413"/>
           </a:xfrm>
           <a:prstGeom prst="rect">
             <a:avLst/>
           </a:prstGeom>
-          <a:noFill/>
+          <a:ln>
+            <a:noFill/>
+          </a:ln>
         </p:spPr>
-        <p:txBody>
-          <a:bodyPr rot="0" spcFirstLastPara="0" vertOverflow="overflow" horzOverflow="overflow" vert="horz" wrap="square" lIns="91440" tIns="45720" rIns="91440" bIns="45720" numCol="1" spcCol="0" rtlCol="0" fromWordArt="0" anchor="t" anchorCtr="0" forceAA="0" compatLnSpc="1">
-            <a:prstTxWarp prst="textNoShape">
-              <a:avLst/>
-            </a:prstTxWarp>
-            <a:spAutoFit/>
-          </a:bodyPr>
-          <a:lstStyle/>
-          <a:p>
-            <a:pPr marL="285750" indent="-285750">
-              <a:buFont typeface="Wingdings"/>
-              <a:buChar char="Ø"/>
-            </a:pPr>
-            <a:r>
-              <a:rPr lang="ko-KR" altLang="en-US" sz="1400" b="1">
-                <a:latin typeface="LG Smart_H2.0 R"/>
-                <a:ea typeface="LG Smart_H2.0 R"/>
-                <a:cs typeface="Calibri" panose="020F0502020204030204"/>
-              </a:rPr>
-              <a:t>SW </a:t>
-            </a:r>
-            <a:r>
-              <a:rPr lang="ko-KR" altLang="en-US" sz="1400" b="1" err="1">
-                <a:latin typeface="LG Smart_H2.0 R"/>
-                <a:ea typeface="LG Smart_H2.0 R"/>
-                <a:cs typeface="Calibri" panose="020F0502020204030204"/>
-              </a:rPr>
-              <a:t>Mix를</a:t>
-            </a:r>
-            <a:r>
-              <a:rPr lang="ko-KR" altLang="en-US" sz="1400" b="1">
-                <a:latin typeface="LG Smart_H2.0 R"/>
-                <a:ea typeface="LG Smart_H2.0 R"/>
-                <a:cs typeface="Calibri" panose="020F0502020204030204"/>
-              </a:rPr>
-              <a:t> 통해 단일 </a:t>
-            </a:r>
-            <a:r>
-              <a:rPr lang="ko-KR" altLang="en-US" sz="1400" b="1" err="1">
-                <a:latin typeface="LG Smart_H2.0 R"/>
-                <a:ea typeface="LG Smart_H2.0 R"/>
-                <a:cs typeface="Calibri" panose="020F0502020204030204"/>
-              </a:rPr>
-              <a:t>Audio</a:t>
-            </a:r>
-            <a:r>
-              <a:rPr lang="ko-KR" altLang="en-US" sz="1400" b="1">
-                <a:latin typeface="LG Smart_H2.0 R"/>
-                <a:ea typeface="LG Smart_H2.0 R"/>
-                <a:cs typeface="Calibri" panose="020F0502020204030204"/>
-              </a:rPr>
-              <a:t> </a:t>
-            </a:r>
-            <a:r>
-              <a:rPr lang="ko-KR" altLang="en-US" sz="1400" b="1" err="1">
-                <a:latin typeface="LG Smart_H2.0 R"/>
-                <a:ea typeface="LG Smart_H2.0 R"/>
-                <a:cs typeface="Calibri" panose="020F0502020204030204"/>
-              </a:rPr>
-              <a:t>Stream</a:t>
-            </a:r>
-            <a:r>
-              <a:rPr lang="ko-KR" altLang="en-US" sz="1400" b="1">
-                <a:latin typeface="LG Smart_H2.0 R"/>
-                <a:ea typeface="LG Smart_H2.0 R"/>
-                <a:cs typeface="Calibri" panose="020F0502020204030204"/>
-              </a:rPr>
-              <a:t> 처리</a:t>
-            </a:r>
-            <a:endParaRPr lang="en-US" altLang="ko-KR"/>
-          </a:p>
-          <a:p>
-            <a:pPr marL="285750" indent="-285750">
-              <a:buFont typeface="Wingdings"/>
-              <a:buChar char="Ø"/>
-            </a:pPr>
-            <a:r>
-              <a:rPr lang="ko-KR" altLang="en-US" sz="1400" b="1" err="1">
-                <a:latin typeface="LG Smart_H2.0 R"/>
-                <a:ea typeface="LG Smart_H2.0 R"/>
-                <a:cs typeface="Calibri" panose="020F0502020204030204"/>
-              </a:rPr>
-              <a:t>Buffer</a:t>
-            </a:r>
-            <a:r>
-              <a:rPr lang="ko-KR" altLang="en-US" sz="1400" b="1">
-                <a:latin typeface="LG Smart_H2.0 R"/>
-                <a:ea typeface="LG Smart_H2.0 R"/>
-                <a:cs typeface="Calibri" panose="020F0502020204030204"/>
-              </a:rPr>
-              <a:t>, </a:t>
-            </a:r>
-            <a:r>
-              <a:rPr lang="ko-KR" altLang="en-US" sz="1400" b="1" err="1">
-                <a:latin typeface="LG Smart_H2.0 R"/>
-                <a:ea typeface="LG Smart_H2.0 R"/>
-                <a:cs typeface="Calibri" panose="020F0502020204030204"/>
-              </a:rPr>
-              <a:t>Period</a:t>
-            </a:r>
-            <a:r>
-              <a:rPr lang="ko-KR" altLang="en-US" sz="1400" b="1">
-                <a:latin typeface="LG Smart_H2.0 R"/>
-                <a:ea typeface="LG Smart_H2.0 R"/>
-                <a:cs typeface="Calibri" panose="020F0502020204030204"/>
-              </a:rPr>
-              <a:t> </a:t>
-            </a:r>
-            <a:r>
-              <a:rPr lang="ko-KR" altLang="en-US" sz="1400" b="1" err="1">
-                <a:latin typeface="LG Smart_H2.0 R"/>
-                <a:ea typeface="LG Smart_H2.0 R"/>
-                <a:cs typeface="Calibri" panose="020F0502020204030204"/>
-              </a:rPr>
-              <a:t>Size</a:t>
-            </a:r>
-            <a:r>
-              <a:rPr lang="ko-KR" altLang="en-US" sz="1400" b="1">
-                <a:latin typeface="LG Smart_H2.0 R"/>
-                <a:ea typeface="LG Smart_H2.0 R"/>
-                <a:cs typeface="Calibri" panose="020F0502020204030204"/>
-              </a:rPr>
-              <a:t> 최적화를 통해 안정성 및 </a:t>
-            </a:r>
-            <a:r>
-              <a:rPr lang="ko-KR" altLang="en-US" sz="1400" b="1" err="1">
-                <a:latin typeface="LG Smart_H2.0 R"/>
-                <a:ea typeface="LG Smart_H2.0 R"/>
-                <a:cs typeface="Calibri" panose="020F0502020204030204"/>
-              </a:rPr>
-              <a:t>Low</a:t>
-            </a:r>
-            <a:r>
-              <a:rPr lang="ko-KR" altLang="en-US" sz="1400" b="1">
-                <a:latin typeface="LG Smart_H2.0 R"/>
-                <a:ea typeface="LG Smart_H2.0 R"/>
-                <a:cs typeface="Calibri" panose="020F0502020204030204"/>
-              </a:rPr>
-              <a:t> </a:t>
-            </a:r>
-            <a:r>
-              <a:rPr lang="ko-KR" altLang="en-US" sz="1400" b="1" err="1">
-                <a:latin typeface="LG Smart_H2.0 R"/>
-                <a:ea typeface="LG Smart_H2.0 R"/>
-                <a:cs typeface="Calibri" panose="020F0502020204030204"/>
-              </a:rPr>
-              <a:t>Latency</a:t>
-            </a:r>
-            <a:r>
-              <a:rPr lang="ko-KR" altLang="en-US" sz="1400" b="1">
-                <a:latin typeface="LG Smart_H2.0 R"/>
-                <a:ea typeface="LG Smart_H2.0 R"/>
-                <a:cs typeface="Calibri" panose="020F0502020204030204"/>
-              </a:rPr>
-              <a:t> 확보</a:t>
-            </a:r>
-            <a:endParaRPr lang="ko-KR"/>
-          </a:p>
-        </p:txBody>
-      </p:sp>
+      </p:pic>
+      <p:pic>
+        <p:nvPicPr>
+          <p:cNvPr id="7" name="Picture 6" descr="A diagram of a computer&#10;&#10;AI-generated content may be incorrect.">
+            <a:extLst>
+              <a:ext uri="{FF2B5EF4-FFF2-40B4-BE49-F238E27FC236}">
+                <a16:creationId xmlns:a16="http://schemas.microsoft.com/office/drawing/2014/main" id="{461CF0B9-AC27-B4D4-3E40-8D7664B62BE0}"/>
+              </a:ext>
+            </a:extLst>
+          </p:cNvPr>
+          <p:cNvPicPr>
+            <a:picLocks noChangeAspect="1"/>
+          </p:cNvPicPr>
+          <p:nvPr/>
+        </p:nvPicPr>
+        <p:blipFill>
+          <a:blip r:embed="rId4"/>
+          <a:stretch>
+            <a:fillRect/>
+          </a:stretch>
+        </p:blipFill>
+        <p:spPr>
+          <a:xfrm>
+            <a:off x="811389" y="3990140"/>
+            <a:ext cx="5298724" cy="2038607"/>
+          </a:xfrm>
+          <a:prstGeom prst="rect">
+            <a:avLst/>
+          </a:prstGeom>
+        </p:spPr>
+      </p:pic>
       <p:sp>
         <p:nvSpPr>
           <p:cNvPr id="69" name="TextBox 68">
             <a:extLst>
               <a:ext uri="{FF2B5EF4-FFF2-40B4-BE49-F238E27FC236}">
-                <a16:creationId xmlns:a16="http://schemas.microsoft.com/office/drawing/2014/main" id="{F71AAE28-AF45-C246-F0E3-1C4E945B00DD}"/>
+                <a16:creationId xmlns:a16="http://schemas.microsoft.com/office/drawing/2014/main" id="{98BBB3CB-E2C0-5AAD-DB71-B5307906A006}"/>
               </a:ext>
             </a:extLst>
           </p:cNvPr>
@@ -2994,10 +4576,58 @@
           </a:p>
         </p:txBody>
       </p:sp>
+      <p:sp>
+        <p:nvSpPr>
+          <p:cNvPr id="9" name="TextBox 8">
+            <a:extLst>
+              <a:ext uri="{FF2B5EF4-FFF2-40B4-BE49-F238E27FC236}">
+                <a16:creationId xmlns:a16="http://schemas.microsoft.com/office/drawing/2014/main" id="{1999D780-52C8-A3D6-1523-67909F7B7224}"/>
+              </a:ext>
+            </a:extLst>
+          </p:cNvPr>
+          <p:cNvSpPr txBox="1"/>
+          <p:nvPr/>
+        </p:nvSpPr>
+        <p:spPr>
+          <a:xfrm>
+            <a:off x="6308558" y="9550400"/>
+            <a:ext cx="550779" cy="349904"/>
+          </a:xfrm>
+          <a:prstGeom prst="rect">
+            <a:avLst/>
+          </a:prstGeom>
+          <a:noFill/>
+        </p:spPr>
+        <p:txBody>
+          <a:bodyPr rot="0" spcFirstLastPara="0" vertOverflow="overflow" horzOverflow="overflow" vert="horz" wrap="square" lIns="91440" tIns="45720" rIns="91440" bIns="45720" numCol="1" spcCol="0" rtlCol="0" fromWordArt="0" anchor="t" anchorCtr="0" forceAA="0" compatLnSpc="1">
+            <a:prstTxWarp prst="textNoShape">
+              <a:avLst/>
+            </a:prstTxWarp>
+            <a:spAutoFit/>
+          </a:bodyPr>
+          <a:lstStyle/>
+          <a:p>
+            <a:pPr algn="r">
+              <a:lnSpc>
+                <a:spcPts val="2175"/>
+              </a:lnSpc>
+            </a:pPr>
+            <a:r>
+              <a:rPr lang="ko-KR" altLang="en-US" sz="1400">
+                <a:latin typeface="Arial"/>
+                <a:ea typeface="LG Smart_H2.0 R"/>
+                <a:cs typeface="Arial"/>
+              </a:rPr>
+              <a:t>2/2</a:t>
+            </a:r>
+            <a:endParaRPr lang="en-US" altLang="ko-KR"/>
+          </a:p>
+        </p:txBody>
+      </p:sp>
     </p:spTree>
     <p:extLst>
       <p:ext uri="{BB962C8B-B14F-4D97-AF65-F5344CB8AC3E}">
-        <p14:creationId xmlns:p14="http://schemas.microsoft.com/office/powerpoint/2010/main" val="3287572541"/>
+        <p14:creationId xmlns:p14="http://schemas.microsoft.com/office/powerpoint/2010/main" val="1680971983"/>
       </p:ext>
     </p:extLst>
   </p:cSld>

</xml_diff>